<commit_message>
copy hw3.cgi to /hw4
</commit_message>
<xml_diff>
--- a/hw4/NP_project4.pptx
+++ b/hw4/NP_project4.pptx
@@ -5,53 +5,54 @@
     <p:sldMasterId id="2147483648" r:id="rId1"/>
   </p:sldMasterIdLst>
   <p:notesMasterIdLst>
-    <p:notesMasterId r:id="rId43"/>
+    <p:notesMasterId r:id="rId44"/>
   </p:notesMasterIdLst>
   <p:handoutMasterIdLst>
-    <p:handoutMasterId r:id="rId44"/>
+    <p:handoutMasterId r:id="rId45"/>
   </p:handoutMasterIdLst>
   <p:sldIdLst>
-    <p:sldId id="256" r:id="rId2"/>
-    <p:sldId id="309" r:id="rId3"/>
-    <p:sldId id="327" r:id="rId4"/>
-    <p:sldId id="310" r:id="rId5"/>
-    <p:sldId id="304" r:id="rId6"/>
-    <p:sldId id="275" r:id="rId7"/>
-    <p:sldId id="328" r:id="rId8"/>
-    <p:sldId id="329" r:id="rId9"/>
-    <p:sldId id="295" r:id="rId10"/>
-    <p:sldId id="308" r:id="rId11"/>
-    <p:sldId id="319" r:id="rId12"/>
-    <p:sldId id="306" r:id="rId13"/>
-    <p:sldId id="277" r:id="rId14"/>
-    <p:sldId id="313" r:id="rId15"/>
-    <p:sldId id="286" r:id="rId16"/>
-    <p:sldId id="296" r:id="rId17"/>
-    <p:sldId id="297" r:id="rId18"/>
-    <p:sldId id="303" r:id="rId19"/>
-    <p:sldId id="314" r:id="rId20"/>
-    <p:sldId id="305" r:id="rId21"/>
-    <p:sldId id="271" r:id="rId22"/>
-    <p:sldId id="302" r:id="rId23"/>
-    <p:sldId id="300" r:id="rId24"/>
-    <p:sldId id="301" r:id="rId25"/>
-    <p:sldId id="320" r:id="rId26"/>
-    <p:sldId id="318" r:id="rId27"/>
-    <p:sldId id="321" r:id="rId28"/>
-    <p:sldId id="270" r:id="rId29"/>
-    <p:sldId id="307" r:id="rId30"/>
-    <p:sldId id="281" r:id="rId31"/>
-    <p:sldId id="282" r:id="rId32"/>
-    <p:sldId id="284" r:id="rId33"/>
-    <p:sldId id="283" r:id="rId34"/>
-    <p:sldId id="315" r:id="rId35"/>
-    <p:sldId id="317" r:id="rId36"/>
-    <p:sldId id="316" r:id="rId37"/>
-    <p:sldId id="322" r:id="rId38"/>
-    <p:sldId id="323" r:id="rId39"/>
-    <p:sldId id="324" r:id="rId40"/>
-    <p:sldId id="325" r:id="rId41"/>
-    <p:sldId id="326" r:id="rId42"/>
+    <p:sldId id="330" r:id="rId2"/>
+    <p:sldId id="256" r:id="rId3"/>
+    <p:sldId id="309" r:id="rId4"/>
+    <p:sldId id="327" r:id="rId5"/>
+    <p:sldId id="310" r:id="rId6"/>
+    <p:sldId id="304" r:id="rId7"/>
+    <p:sldId id="275" r:id="rId8"/>
+    <p:sldId id="328" r:id="rId9"/>
+    <p:sldId id="329" r:id="rId10"/>
+    <p:sldId id="295" r:id="rId11"/>
+    <p:sldId id="308" r:id="rId12"/>
+    <p:sldId id="319" r:id="rId13"/>
+    <p:sldId id="306" r:id="rId14"/>
+    <p:sldId id="277" r:id="rId15"/>
+    <p:sldId id="313" r:id="rId16"/>
+    <p:sldId id="286" r:id="rId17"/>
+    <p:sldId id="296" r:id="rId18"/>
+    <p:sldId id="297" r:id="rId19"/>
+    <p:sldId id="303" r:id="rId20"/>
+    <p:sldId id="314" r:id="rId21"/>
+    <p:sldId id="305" r:id="rId22"/>
+    <p:sldId id="271" r:id="rId23"/>
+    <p:sldId id="302" r:id="rId24"/>
+    <p:sldId id="300" r:id="rId25"/>
+    <p:sldId id="301" r:id="rId26"/>
+    <p:sldId id="320" r:id="rId27"/>
+    <p:sldId id="318" r:id="rId28"/>
+    <p:sldId id="321" r:id="rId29"/>
+    <p:sldId id="270" r:id="rId30"/>
+    <p:sldId id="307" r:id="rId31"/>
+    <p:sldId id="281" r:id="rId32"/>
+    <p:sldId id="282" r:id="rId33"/>
+    <p:sldId id="284" r:id="rId34"/>
+    <p:sldId id="283" r:id="rId35"/>
+    <p:sldId id="315" r:id="rId36"/>
+    <p:sldId id="317" r:id="rId37"/>
+    <p:sldId id="316" r:id="rId38"/>
+    <p:sldId id="322" r:id="rId39"/>
+    <p:sldId id="323" r:id="rId40"/>
+    <p:sldId id="324" r:id="rId41"/>
+    <p:sldId id="325" r:id="rId42"/>
+    <p:sldId id="326" r:id="rId43"/>
   </p:sldIdLst>
   <p:sldSz cx="9144000" cy="6858000" type="screen4x3"/>
   <p:notesSz cx="6858000" cy="9144000"/>
@@ -266,7 +267,7 @@
             <a:fld id="{1DC1E6A3-0325-46CC-AC2E-3E9CEBCCB368}" type="datetimeFigureOut">
               <a:rPr lang="zh-TW" altLang="en-US" smtClean="0"/>
               <a:pPr/>
-              <a:t>2017/12/14</a:t>
+              <a:t>2017/12/15</a:t>
             </a:fld>
             <a:endParaRPr lang="zh-TW" altLang="en-US"/>
           </a:p>
@@ -433,7 +434,7 @@
             <a:fld id="{4176B2CF-0407-49EA-AD87-8B3297602A76}" type="datetimeFigureOut">
               <a:rPr lang="zh-TW" altLang="en-US" smtClean="0"/>
               <a:pPr/>
-              <a:t>2017/12/14</a:t>
+              <a:t>2017/12/15</a:t>
             </a:fld>
             <a:endParaRPr lang="zh-TW" altLang="en-US"/>
           </a:p>
@@ -775,7 +776,7 @@
             <a:fld id="{6AC75B32-9DA4-4D3C-BA65-F5DBDDE3DF19}" type="slidenum">
               <a:rPr lang="zh-TW" altLang="en-US" smtClean="0"/>
               <a:pPr/>
-              <a:t>1</a:t>
+              <a:t>2</a:t>
             </a:fld>
             <a:endParaRPr lang="zh-TW" altLang="en-US"/>
           </a:p>
@@ -865,7 +866,7 @@
             <a:fld id="{6AC75B32-9DA4-4D3C-BA65-F5DBDDE3DF19}" type="slidenum">
               <a:rPr lang="zh-TW" altLang="en-US" smtClean="0"/>
               <a:pPr/>
-              <a:t>29</a:t>
+              <a:t>30</a:t>
             </a:fld>
             <a:endParaRPr lang="zh-TW" altLang="en-US"/>
           </a:p>
@@ -955,7 +956,7 @@
             <a:fld id="{6AC75B32-9DA4-4D3C-BA65-F5DBDDE3DF19}" type="slidenum">
               <a:rPr lang="zh-TW" altLang="en-US" smtClean="0"/>
               <a:pPr/>
-              <a:t>5</a:t>
+              <a:t>6</a:t>
             </a:fld>
             <a:endParaRPr lang="zh-TW" altLang="en-US"/>
           </a:p>
@@ -1091,7 +1092,7 @@
             <a:fld id="{34B7BF6D-4AB5-43D6-AD1B-60F53B98C632}" type="slidenum">
               <a:rPr lang="zh-TW" altLang="en-US" smtClean="0"/>
               <a:pPr/>
-              <a:t>6</a:t>
+              <a:t>7</a:t>
             </a:fld>
             <a:endParaRPr lang="zh-TW" altLang="en-US"/>
           </a:p>
@@ -1181,7 +1182,7 @@
             <a:fld id="{6AC75B32-9DA4-4D3C-BA65-F5DBDDE3DF19}" type="slidenum">
               <a:rPr lang="zh-TW" altLang="en-US" smtClean="0"/>
               <a:pPr/>
-              <a:t>12</a:t>
+              <a:t>13</a:t>
             </a:fld>
             <a:endParaRPr lang="zh-TW" altLang="en-US"/>
           </a:p>
@@ -1290,7 +1291,7 @@
             <a:fld id="{34B7BF6D-4AB5-43D6-AD1B-60F53B98C632}" type="slidenum">
               <a:rPr lang="zh-TW" altLang="en-US" smtClean="0"/>
               <a:pPr/>
-              <a:t>13</a:t>
+              <a:t>14</a:t>
             </a:fld>
             <a:endParaRPr lang="zh-TW" altLang="en-US"/>
           </a:p>
@@ -1375,7 +1376,7 @@
             <a:fld id="{34B7BF6D-4AB5-43D6-AD1B-60F53B98C632}" type="slidenum">
               <a:rPr lang="zh-TW" altLang="en-US" smtClean="0"/>
               <a:pPr/>
-              <a:t>17</a:t>
+              <a:t>18</a:t>
             </a:fld>
             <a:endParaRPr lang="zh-TW" altLang="en-US"/>
           </a:p>
@@ -1465,7 +1466,7 @@
             <a:fld id="{6AC75B32-9DA4-4D3C-BA65-F5DBDDE3DF19}" type="slidenum">
               <a:rPr lang="zh-TW" altLang="en-US" smtClean="0"/>
               <a:pPr/>
-              <a:t>20</a:t>
+              <a:t>21</a:t>
             </a:fld>
             <a:endParaRPr lang="zh-TW" altLang="en-US"/>
           </a:p>
@@ -1550,7 +1551,7 @@
             <a:fld id="{34B7BF6D-4AB5-43D6-AD1B-60F53B98C632}" type="slidenum">
               <a:rPr lang="zh-TW" altLang="en-US" smtClean="0"/>
               <a:pPr/>
-              <a:t>21</a:t>
+              <a:t>22</a:t>
             </a:fld>
             <a:endParaRPr lang="zh-TW" altLang="en-US"/>
           </a:p>
@@ -1853,7 +1854,7 @@
             <a:fld id="{34B7BF6D-4AB5-43D6-AD1B-60F53B98C632}" type="slidenum">
               <a:rPr lang="zh-TW" altLang="en-US" smtClean="0"/>
               <a:pPr/>
-              <a:t>22</a:t>
+              <a:t>23</a:t>
             </a:fld>
             <a:endParaRPr lang="zh-TW" altLang="en-US"/>
           </a:p>
@@ -2061,7 +2062,7 @@
             <a:fld id="{5BBEAD13-0566-4C6C-97E7-55F17F24B09F}" type="datetimeFigureOut">
               <a:rPr lang="zh-TW" altLang="en-US" smtClean="0"/>
               <a:pPr/>
-              <a:t>2017/12/14</a:t>
+              <a:t>2017/12/15</a:t>
             </a:fld>
             <a:endParaRPr lang="zh-TW" altLang="en-US"/>
           </a:p>
@@ -2235,7 +2236,7 @@
             <a:fld id="{5BBEAD13-0566-4C6C-97E7-55F17F24B09F}" type="datetimeFigureOut">
               <a:rPr lang="zh-TW" altLang="en-US" smtClean="0"/>
               <a:pPr/>
-              <a:t>2017/12/14</a:t>
+              <a:t>2017/12/15</a:t>
             </a:fld>
             <a:endParaRPr lang="zh-TW" altLang="en-US"/>
           </a:p>
@@ -2412,7 +2413,7 @@
             <a:fld id="{5BBEAD13-0566-4C6C-97E7-55F17F24B09F}" type="datetimeFigureOut">
               <a:rPr lang="zh-TW" altLang="en-US" smtClean="0"/>
               <a:pPr/>
-              <a:t>2017/12/14</a:t>
+              <a:t>2017/12/15</a:t>
             </a:fld>
             <a:endParaRPr lang="zh-TW" altLang="en-US"/>
           </a:p>
@@ -2589,7 +2590,7 @@
             <a:fld id="{5BBEAD13-0566-4C6C-97E7-55F17F24B09F}" type="datetimeFigureOut">
               <a:rPr lang="zh-TW" altLang="en-US" smtClean="0"/>
               <a:pPr/>
-              <a:t>2017/12/14</a:t>
+              <a:t>2017/12/15</a:t>
             </a:fld>
             <a:endParaRPr lang="zh-TW" altLang="en-US"/>
           </a:p>
@@ -2839,7 +2840,7 @@
             <a:fld id="{5BBEAD13-0566-4C6C-97E7-55F17F24B09F}" type="datetimeFigureOut">
               <a:rPr lang="zh-TW" altLang="en-US" smtClean="0"/>
               <a:pPr/>
-              <a:t>2017/12/14</a:t>
+              <a:t>2017/12/15</a:t>
             </a:fld>
             <a:endParaRPr lang="zh-TW" altLang="en-US"/>
           </a:p>
@@ -3124,7 +3125,7 @@
             <a:fld id="{5BBEAD13-0566-4C6C-97E7-55F17F24B09F}" type="datetimeFigureOut">
               <a:rPr lang="zh-TW" altLang="en-US" smtClean="0"/>
               <a:pPr/>
-              <a:t>2017/12/14</a:t>
+              <a:t>2017/12/15</a:t>
             </a:fld>
             <a:endParaRPr lang="zh-TW" altLang="en-US"/>
           </a:p>
@@ -3543,7 +3544,7 @@
             <a:fld id="{5BBEAD13-0566-4C6C-97E7-55F17F24B09F}" type="datetimeFigureOut">
               <a:rPr lang="zh-TW" altLang="en-US" smtClean="0"/>
               <a:pPr/>
-              <a:t>2017/12/14</a:t>
+              <a:t>2017/12/15</a:t>
             </a:fld>
             <a:endParaRPr lang="zh-TW" altLang="en-US"/>
           </a:p>
@@ -3665,7 +3666,7 @@
             <a:fld id="{5BBEAD13-0566-4C6C-97E7-55F17F24B09F}" type="datetimeFigureOut">
               <a:rPr lang="zh-TW" altLang="en-US" smtClean="0"/>
               <a:pPr/>
-              <a:t>2017/12/14</a:t>
+              <a:t>2017/12/15</a:t>
             </a:fld>
             <a:endParaRPr lang="zh-TW" altLang="en-US"/>
           </a:p>
@@ -3757,7 +3758,7 @@
             <a:fld id="{5BBEAD13-0566-4C6C-97E7-55F17F24B09F}" type="datetimeFigureOut">
               <a:rPr lang="zh-TW" altLang="en-US" smtClean="0"/>
               <a:pPr/>
-              <a:t>2017/12/14</a:t>
+              <a:t>2017/12/15</a:t>
             </a:fld>
             <a:endParaRPr lang="zh-TW" altLang="en-US"/>
           </a:p>
@@ -4031,7 +4032,7 @@
             <a:fld id="{5BBEAD13-0566-4C6C-97E7-55F17F24B09F}" type="datetimeFigureOut">
               <a:rPr lang="zh-TW" altLang="en-US" smtClean="0"/>
               <a:pPr/>
-              <a:t>2017/12/14</a:t>
+              <a:t>2017/12/15</a:t>
             </a:fld>
             <a:endParaRPr lang="zh-TW" altLang="en-US"/>
           </a:p>
@@ -4281,7 +4282,7 @@
             <a:fld id="{5BBEAD13-0566-4C6C-97E7-55F17F24B09F}" type="datetimeFigureOut">
               <a:rPr lang="zh-TW" altLang="en-US" smtClean="0"/>
               <a:pPr/>
-              <a:t>2017/12/14</a:t>
+              <a:t>2017/12/15</a:t>
             </a:fld>
             <a:endParaRPr lang="zh-TW" altLang="en-US"/>
           </a:p>
@@ -4491,7 +4492,7 @@
             <a:fld id="{5BBEAD13-0566-4C6C-97E7-55F17F24B09F}" type="datetimeFigureOut">
               <a:rPr lang="zh-TW" altLang="en-US" smtClean="0"/>
               <a:pPr/>
-              <a:t>2017/12/14</a:t>
+              <a:t>2017/12/15</a:t>
             </a:fld>
             <a:endParaRPr lang="zh-TW" altLang="en-US"/>
           </a:p>
@@ -4876,7 +4877,7 @@
             <a:spLocks noGrp="1"/>
           </p:cNvSpPr>
           <p:nvPr>
-            <p:ph type="ctrTitle"/>
+            <p:ph type="title"/>
           </p:nvPr>
         </p:nvSpPr>
         <p:spPr/>
@@ -4884,78 +4885,344 @@
           <a:bodyPr/>
           <a:lstStyle/>
           <a:p>
-            <a:r>
-              <a:rPr lang="en-US" dirty="0" smtClean="0">
-                <a:latin typeface="+mj-ea"/>
-                <a:ea typeface="+mj-ea"/>
-              </a:rPr>
-              <a:t>Project IV: </a:t>
-            </a:r>
-            <a:br>
-              <a:rPr lang="en-US" dirty="0" smtClean="0">
-                <a:latin typeface="+mj-ea"/>
-                <a:ea typeface="+mj-ea"/>
-              </a:rPr>
-            </a:br>
-            <a:r>
-              <a:rPr lang="en-US" dirty="0" smtClean="0">
-                <a:latin typeface="+mj-ea"/>
-                <a:ea typeface="+mj-ea"/>
-              </a:rPr>
-              <a:t>SOCKS4 Server</a:t>
-            </a:r>
-            <a:endParaRPr lang="zh-TW" altLang="en-US" dirty="0">
-              <a:latin typeface="+mj-ea"/>
-              <a:ea typeface="+mj-ea"/>
-            </a:endParaRPr>
-          </a:p>
-        </p:txBody>
-      </p:sp>
-      <p:sp>
-        <p:nvSpPr>
-          <p:cNvPr id="3" name="副標題 2"/>
+            <a:endParaRPr lang="zh-TW" altLang="en-US"/>
+          </a:p>
+        </p:txBody>
+      </p:sp>
+      <p:sp>
+        <p:nvSpPr>
+          <p:cNvPr id="3" name="內容版面配置區 2"/>
           <p:cNvSpPr>
             <a:spLocks noGrp="1"/>
           </p:cNvSpPr>
           <p:nvPr>
-            <p:ph type="subTitle" idx="1"/>
+            <p:ph idx="1"/>
           </p:nvPr>
         </p:nvSpPr>
         <p:spPr/>
         <p:txBody>
-          <a:bodyPr/>
-          <a:lstStyle/>
-          <a:p>
-            <a:r>
-              <a:rPr lang="en-US" altLang="zh-TW" dirty="0" smtClean="0"/>
-              <a:t>Prof. I-Chen Wu</a:t>
-            </a:r>
-          </a:p>
-          <a:p>
-            <a:r>
-              <a:rPr lang="en-US" altLang="zh-TW" dirty="0" smtClean="0">
-                <a:cs typeface="Times New Roman" pitchFamily="18" charset="0"/>
-              </a:rPr>
-              <a:t>Network Programming</a:t>
-            </a:r>
-            <a:endParaRPr lang="zh-TW" altLang="en-US" dirty="0">
-              <a:cs typeface="Times New Roman" pitchFamily="18" charset="0"/>
-            </a:endParaRPr>
+          <a:bodyPr>
+            <a:normAutofit fontScale="47500" lnSpcReduction="20000"/>
+          </a:bodyPr>
+          <a:lstStyle/>
+          <a:p>
+            <a:r>
+              <a:rPr lang="zh-TW" altLang="en-US" dirty="0"/>
+              <a:t>大家好</a:t>
+            </a:r>
+            <a:r>
+              <a:rPr lang="zh-TW" altLang="en-US" dirty="0"/>
+              <a:t/>
+            </a:r>
+            <a:br>
+              <a:rPr lang="zh-TW" altLang="en-US" dirty="0"/>
+            </a:br>
+            <a:r>
+              <a:rPr lang="zh-TW" altLang="en-US" dirty="0"/>
+              <a:t>這是最後一次</a:t>
+            </a:r>
+            <a:r>
+              <a:rPr lang="en-US" altLang="zh-TW" dirty="0"/>
+              <a:t>project</a:t>
+            </a:r>
+            <a:r>
+              <a:rPr lang="en-US" altLang="zh-TW" dirty="0"/>
+              <a:t/>
+            </a:r>
+            <a:br>
+              <a:rPr lang="en-US" altLang="zh-TW" dirty="0"/>
+            </a:br>
+            <a:r>
+              <a:rPr lang="zh-TW" altLang="en-US" dirty="0"/>
+              <a:t>主要分三個部分</a:t>
+            </a:r>
+            <a:r>
+              <a:rPr lang="en-US" altLang="zh-TW" dirty="0"/>
+              <a:t>:</a:t>
+            </a:r>
+            <a:r>
+              <a:rPr lang="zh-TW" altLang="en-US" dirty="0"/>
+              <a:t/>
+            </a:r>
+            <a:br>
+              <a:rPr lang="zh-TW" altLang="en-US" dirty="0"/>
+            </a:br>
+            <a:r>
+              <a:rPr lang="en-US" altLang="zh-TW" dirty="0"/>
+              <a:t>SOCKS server + connect mode</a:t>
+            </a:r>
+          </a:p>
+          <a:p>
+            <a:r>
+              <a:rPr lang="en-US" altLang="zh-TW" dirty="0"/>
+              <a:t>SOCKS server + bind mode: </a:t>
+            </a:r>
+            <a:r>
+              <a:rPr lang="zh-TW" altLang="en-US" dirty="0"/>
+              <a:t>可透過 </a:t>
+            </a:r>
+            <a:r>
+              <a:rPr lang="en-US" altLang="zh-TW" dirty="0"/>
+              <a:t>FTP Client</a:t>
+            </a:r>
+            <a:r>
+              <a:rPr lang="zh-TW" altLang="en-US" dirty="0"/>
+              <a:t>上傳</a:t>
+            </a:r>
+            <a:r>
+              <a:rPr lang="en-US" altLang="zh-TW" dirty="0"/>
+              <a:t>/</a:t>
+            </a:r>
+            <a:r>
+              <a:rPr lang="zh-TW" altLang="en-US" dirty="0"/>
+              <a:t>下載檔案</a:t>
+            </a:r>
+          </a:p>
+          <a:p>
+            <a:r>
+              <a:rPr lang="en-US" altLang="zh-TW" dirty="0"/>
+              <a:t>CGI</a:t>
+            </a:r>
+            <a:r>
+              <a:rPr lang="zh-TW" altLang="en-US" dirty="0"/>
+              <a:t>可以連線到</a:t>
+            </a:r>
+            <a:r>
+              <a:rPr lang="en-US" altLang="zh-TW" dirty="0"/>
+              <a:t>SOCKS server</a:t>
+            </a:r>
+          </a:p>
+          <a:p>
+            <a:r>
+              <a:rPr lang="zh-TW" altLang="en-US" dirty="0"/>
+              <a:t>請參考 </a:t>
+            </a:r>
+            <a:r>
+              <a:rPr lang="en-US" altLang="zh-TW" dirty="0"/>
+              <a:t>NP_project4.pptx</a:t>
+            </a:r>
+            <a:br>
+              <a:rPr lang="en-US" altLang="zh-TW" dirty="0"/>
+            </a:br>
+            <a:r>
+              <a:rPr lang="en-US" altLang="zh-TW" dirty="0"/>
+              <a:t>Part2, Part3 demo</a:t>
+            </a:r>
+            <a:r>
+              <a:rPr lang="zh-TW" altLang="en-US" dirty="0"/>
+              <a:t>流程請參考 *</a:t>
+            </a:r>
+            <a:r>
+              <a:rPr lang="en-US" altLang="zh-TW" dirty="0"/>
+              <a:t>.mp4</a:t>
+            </a:r>
+            <a:r>
+              <a:rPr lang="zh-TW" altLang="en-US" dirty="0"/>
+              <a:t>檔</a:t>
+            </a:r>
+            <a:r>
+              <a:rPr lang="zh-TW" altLang="en-US" dirty="0"/>
+              <a:t/>
+            </a:r>
+            <a:br>
+              <a:rPr lang="zh-TW" altLang="en-US" dirty="0"/>
+            </a:br>
+            <a:r>
+              <a:rPr lang="zh-TW" altLang="en-US" dirty="0"/>
+              <a:t/>
+            </a:r>
+            <a:br>
+              <a:rPr lang="zh-TW" altLang="en-US" dirty="0"/>
+            </a:br>
+            <a:r>
+              <a:rPr lang="zh-TW" altLang="en-US" dirty="0"/>
+              <a:t>有問題歡迎在討論區發問 </a:t>
+            </a:r>
+            <a:r>
+              <a:rPr lang="zh-TW" altLang="en-US" dirty="0"/>
+              <a:t/>
+            </a:r>
+            <a:br>
+              <a:rPr lang="zh-TW" altLang="en-US" dirty="0"/>
+            </a:br>
+            <a:r>
+              <a:rPr lang="zh-TW" altLang="en-US" dirty="0"/>
+              <a:t/>
+            </a:r>
+            <a:br>
+              <a:rPr lang="zh-TW" altLang="en-US" dirty="0"/>
+            </a:br>
+            <a:r>
+              <a:rPr lang="zh-TW" altLang="en-US" dirty="0"/>
+              <a:t>需要繳交的檔案為：</a:t>
+            </a:r>
+            <a:r>
+              <a:rPr lang="zh-TW" altLang="en-US" dirty="0"/>
+              <a:t/>
+            </a:r>
+            <a:br>
+              <a:rPr lang="zh-TW" altLang="en-US" dirty="0"/>
+            </a:br>
+            <a:r>
+              <a:rPr lang="en-US" altLang="zh-TW" dirty="0"/>
+              <a:t>socks4 proxy server </a:t>
+            </a:r>
+            <a:r>
+              <a:rPr lang="zh-TW" altLang="en-US" dirty="0"/>
+              <a:t>程式碼</a:t>
+            </a:r>
+          </a:p>
+          <a:p>
+            <a:r>
+              <a:rPr lang="zh-TW" altLang="en-US" dirty="0"/>
+              <a:t>可透過 </a:t>
+            </a:r>
+            <a:r>
+              <a:rPr lang="en-US" altLang="zh-TW" dirty="0"/>
+              <a:t>proxy </a:t>
+            </a:r>
+            <a:r>
+              <a:rPr lang="zh-TW" altLang="en-US" dirty="0"/>
+              <a:t>連線的 </a:t>
+            </a:r>
+            <a:r>
+              <a:rPr lang="en-US" altLang="zh-TW" dirty="0" err="1"/>
+              <a:t>cgi</a:t>
+            </a:r>
+            <a:r>
+              <a:rPr lang="en-US" altLang="zh-TW" dirty="0"/>
+              <a:t> </a:t>
+            </a:r>
+            <a:r>
+              <a:rPr lang="zh-TW" altLang="en-US" dirty="0"/>
+              <a:t>程式碼</a:t>
+            </a:r>
+          </a:p>
+          <a:p>
+            <a:r>
+              <a:rPr lang="en-US" altLang="zh-TW" dirty="0" err="1"/>
+              <a:t>socks.conf</a:t>
+            </a:r>
+            <a:r>
+              <a:rPr lang="en-US" altLang="zh-TW" dirty="0"/>
+              <a:t> (</a:t>
+            </a:r>
+            <a:r>
+              <a:rPr lang="zh-TW" altLang="en-US" dirty="0"/>
+              <a:t>防火牆設定檔</a:t>
+            </a:r>
+            <a:r>
+              <a:rPr lang="en-US" altLang="zh-TW" dirty="0"/>
+              <a:t>)</a:t>
+            </a:r>
+          </a:p>
+          <a:p>
+            <a:r>
+              <a:rPr lang="zh-TW" altLang="en-US" dirty="0"/>
+              <a:t>僅需繳交程式碼，請勿上傳 </a:t>
+            </a:r>
+            <a:r>
+              <a:rPr lang="en-US" altLang="zh-TW" dirty="0" err="1"/>
+              <a:t>git</a:t>
+            </a:r>
+            <a:r>
+              <a:rPr lang="en-US" altLang="zh-TW" dirty="0"/>
+              <a:t> </a:t>
+            </a:r>
+            <a:r>
+              <a:rPr lang="zh-TW" altLang="en-US" dirty="0"/>
+              <a:t>相關檔案，最後的程式碼請打包成 </a:t>
+            </a:r>
+            <a:r>
+              <a:rPr lang="en-US" altLang="zh-TW" dirty="0"/>
+              <a:t>.zip</a:t>
+            </a:r>
+            <a:r>
+              <a:rPr lang="zh-TW" altLang="en-US" dirty="0"/>
+              <a:t>，否則根據情況扣分。</a:t>
+            </a:r>
+            <a:r>
+              <a:rPr lang="zh-TW" altLang="en-US" dirty="0"/>
+              <a:t/>
+            </a:r>
+            <a:br>
+              <a:rPr lang="zh-TW" altLang="en-US" dirty="0"/>
+            </a:br>
+            <a:r>
+              <a:rPr lang="zh-TW" altLang="en-US" dirty="0"/>
+              <a:t/>
+            </a:r>
+            <a:br>
+              <a:rPr lang="zh-TW" altLang="en-US" dirty="0"/>
+            </a:br>
+            <a:r>
+              <a:rPr lang="zh-TW" altLang="en-US" dirty="0"/>
+              <a:t>作業繳交時間為 </a:t>
+            </a:r>
+            <a:r>
+              <a:rPr lang="en-US" altLang="zh-TW" dirty="0"/>
+              <a:t>12/31(</a:t>
+            </a:r>
+            <a:r>
+              <a:rPr lang="zh-TW" altLang="en-US" dirty="0"/>
+              <a:t>日</a:t>
+            </a:r>
+            <a:r>
+              <a:rPr lang="en-US" altLang="zh-TW" dirty="0"/>
+              <a:t>) 23:59</a:t>
+            </a:r>
+            <a:r>
+              <a:rPr lang="zh-TW" altLang="en-US" dirty="0"/>
+              <a:t>，</a:t>
+            </a:r>
+            <a:r>
+              <a:rPr lang="en-US" altLang="zh-TW" dirty="0"/>
+              <a:t>DEMO </a:t>
+            </a:r>
+            <a:r>
+              <a:rPr lang="zh-TW" altLang="en-US" dirty="0"/>
+              <a:t>日期為 </a:t>
+            </a:r>
+            <a:r>
+              <a:rPr lang="en-US" altLang="zh-TW" dirty="0"/>
+              <a:t>1/2(</a:t>
+            </a:r>
+            <a:r>
+              <a:rPr lang="zh-TW" altLang="en-US" dirty="0"/>
+              <a:t>二</a:t>
+            </a:r>
+            <a:r>
+              <a:rPr lang="en-US" altLang="zh-TW" dirty="0"/>
+              <a:t>)</a:t>
+            </a:r>
+            <a:r>
+              <a:rPr lang="zh-TW" altLang="en-US"/>
+              <a:t>。</a:t>
+            </a:r>
+            <a:br>
+              <a:rPr lang="zh-TW" altLang="en-US"/>
+            </a:br>
+            <a:r>
+              <a:rPr lang="zh-TW" altLang="en-US"/>
+              <a:t/>
+            </a:r>
+            <a:br>
+              <a:rPr lang="zh-TW" altLang="en-US"/>
+            </a:br>
+            <a:endParaRPr lang="zh-TW" altLang="en-US"/>
           </a:p>
         </p:txBody>
       </p:sp>
     </p:spTree>
+    <p:extLst>
+      <p:ext uri="{BB962C8B-B14F-4D97-AF65-F5344CB8AC3E}">
+        <p14:creationId xmlns:p14="http://schemas.microsoft.com/office/powerpoint/2010/main" val="1150029327"/>
+      </p:ext>
+    </p:extLst>
   </p:cSld>
   <p:clrMapOvr>
     <a:masterClrMapping/>
   </p:clrMapOvr>
-  <p:timing>
-    <p:tnLst>
-      <p:par>
-        <p:cTn id="1" dur="indefinite" restart="never" nodeType="tmRoot"/>
-      </p:par>
-    </p:tnLst>
-  </p:timing>
 </p:sld>
 </file>
 
@@ -4988,6 +5255,111 @@
         </p:nvSpPr>
         <p:spPr/>
         <p:txBody>
+          <a:bodyPr>
+            <a:normAutofit/>
+          </a:bodyPr>
+          <a:lstStyle/>
+          <a:p>
+            <a:r>
+              <a:rPr lang="en-US" altLang="zh-TW" dirty="0" smtClean="0"/>
+              <a:t>Browser Setting</a:t>
+            </a:r>
+            <a:endParaRPr lang="zh-TW" altLang="en-US" dirty="0"/>
+          </a:p>
+        </p:txBody>
+      </p:sp>
+      <p:sp>
+        <p:nvSpPr>
+          <p:cNvPr id="3" name="內容版面配置區 2"/>
+          <p:cNvSpPr>
+            <a:spLocks noGrp="1"/>
+          </p:cNvSpPr>
+          <p:nvPr>
+            <p:ph idx="1"/>
+          </p:nvPr>
+        </p:nvSpPr>
+        <p:spPr/>
+        <p:txBody>
+          <a:bodyPr/>
+          <a:lstStyle/>
+          <a:p>
+            <a:endParaRPr lang="zh-TW" altLang="en-US" dirty="0"/>
+          </a:p>
+        </p:txBody>
+      </p:sp>
+      <p:pic>
+        <p:nvPicPr>
+          <p:cNvPr id="4" name="圖片 3"/>
+          <p:cNvPicPr>
+            <a:picLocks noChangeAspect="1"/>
+          </p:cNvPicPr>
+          <p:nvPr/>
+        </p:nvPicPr>
+        <p:blipFill>
+          <a:blip r:embed="rId2"/>
+          <a:stretch>
+            <a:fillRect/>
+          </a:stretch>
+        </p:blipFill>
+        <p:spPr>
+          <a:xfrm>
+            <a:off x="395536" y="1197150"/>
+            <a:ext cx="7344816" cy="5408711"/>
+          </a:xfrm>
+          <a:prstGeom prst="rect">
+            <a:avLst/>
+          </a:prstGeom>
+        </p:spPr>
+      </p:pic>
+    </p:spTree>
+    <p:extLst>
+      <p:ext uri="{BB962C8B-B14F-4D97-AF65-F5344CB8AC3E}">
+        <p14:creationId xmlns:p14="http://schemas.microsoft.com/office/powerpoint/2010/main" val="3096852479"/>
+      </p:ext>
+    </p:extLst>
+  </p:cSld>
+  <p:clrMapOvr>
+    <a:masterClrMapping/>
+  </p:clrMapOvr>
+  <p:timing>
+    <p:tnLst>
+      <p:par>
+        <p:cTn id="1" dur="indefinite" restart="never" nodeType="tmRoot"/>
+      </p:par>
+    </p:tnLst>
+  </p:timing>
+</p:sld>
+</file>
+
+<file path=ppt/slides/slide11.xml><?xml version="1.0" encoding="utf-8"?>
+<p:sld xmlns:a="http://schemas.openxmlformats.org/drawingml/2006/main" xmlns:r="http://schemas.openxmlformats.org/officeDocument/2006/relationships" xmlns:p="http://schemas.openxmlformats.org/presentationml/2006/main">
+  <p:cSld>
+    <p:spTree>
+      <p:nvGrpSpPr>
+        <p:cNvPr id="1" name=""/>
+        <p:cNvGrpSpPr/>
+        <p:nvPr/>
+      </p:nvGrpSpPr>
+      <p:grpSpPr>
+        <a:xfrm>
+          <a:off x="0" y="0"/>
+          <a:ext cx="0" cy="0"/>
+          <a:chOff x="0" y="0"/>
+          <a:chExt cx="0" cy="0"/>
+        </a:xfrm>
+      </p:grpSpPr>
+      <p:sp>
+        <p:nvSpPr>
+          <p:cNvPr id="2" name="標題 1"/>
+          <p:cNvSpPr>
+            <a:spLocks noGrp="1"/>
+          </p:cNvSpPr>
+          <p:nvPr>
+            <p:ph type="title"/>
+          </p:nvPr>
+        </p:nvSpPr>
+        <p:spPr/>
+        <p:txBody>
           <a:bodyPr/>
           <a:lstStyle/>
           <a:p>
@@ -5111,7 +5483,7 @@
 </p:sld>
 </file>
 
-<file path=ppt/slides/slide11.xml><?xml version="1.0" encoding="utf-8"?>
+<file path=ppt/slides/slide12.xml><?xml version="1.0" encoding="utf-8"?>
 <p:sld xmlns:a="http://schemas.openxmlformats.org/drawingml/2006/main" xmlns:r="http://schemas.openxmlformats.org/officeDocument/2006/relationships" xmlns:p="http://schemas.openxmlformats.org/presentationml/2006/main">
   <p:cSld>
     <p:spTree>
@@ -5407,7 +5779,7 @@
 </p:sld>
 </file>
 
-<file path=ppt/slides/slide12.xml><?xml version="1.0" encoding="utf-8"?>
+<file path=ppt/slides/slide13.xml><?xml version="1.0" encoding="utf-8"?>
 <p:sld xmlns:a="http://schemas.openxmlformats.org/drawingml/2006/main" xmlns:r="http://schemas.openxmlformats.org/officeDocument/2006/relationships" xmlns:p="http://schemas.openxmlformats.org/presentationml/2006/main">
   <p:cSld>
     <p:spTree>
@@ -5511,7 +5883,7 @@
 </p:sld>
 </file>
 
-<file path=ppt/slides/slide13.xml><?xml version="1.0" encoding="utf-8"?>
+<file path=ppt/slides/slide14.xml><?xml version="1.0" encoding="utf-8"?>
 <p:sld xmlns:a="http://schemas.openxmlformats.org/drawingml/2006/main" xmlns:r="http://schemas.openxmlformats.org/officeDocument/2006/relationships" xmlns:p="http://schemas.openxmlformats.org/presentationml/2006/main">
   <p:cSld>
     <p:spTree>
@@ -6207,7 +6579,7 @@
 </p:sld>
 </file>
 
-<file path=ppt/slides/slide14.xml><?xml version="1.0" encoding="utf-8"?>
+<file path=ppt/slides/slide15.xml><?xml version="1.0" encoding="utf-8"?>
 <p:sld xmlns:a="http://schemas.openxmlformats.org/drawingml/2006/main" xmlns:r="http://schemas.openxmlformats.org/officeDocument/2006/relationships" xmlns:p="http://schemas.openxmlformats.org/presentationml/2006/main">
   <p:cSld>
     <p:spTree>
@@ -6469,7 +6841,7 @@
 </p:sld>
 </file>
 
-<file path=ppt/slides/slide15.xml><?xml version="1.0" encoding="utf-8"?>
+<file path=ppt/slides/slide16.xml><?xml version="1.0" encoding="utf-8"?>
 <p:sld xmlns:a="http://schemas.openxmlformats.org/drawingml/2006/main" xmlns:r="http://schemas.openxmlformats.org/officeDocument/2006/relationships" xmlns:p="http://schemas.openxmlformats.org/presentationml/2006/main">
   <p:cSld>
     <p:spTree>
@@ -6631,7 +7003,7 @@
 </p:sld>
 </file>
 
-<file path=ppt/slides/slide16.xml><?xml version="1.0" encoding="utf-8"?>
+<file path=ppt/slides/slide17.xml><?xml version="1.0" encoding="utf-8"?>
 <p:sld xmlns:a="http://schemas.openxmlformats.org/drawingml/2006/main" xmlns:r="http://schemas.openxmlformats.org/officeDocument/2006/relationships" xmlns:p="http://schemas.openxmlformats.org/presentationml/2006/main">
   <p:cSld>
     <p:spTree>
@@ -6826,7 +7198,7 @@
 </p:sld>
 </file>
 
-<file path=ppt/slides/slide17.xml><?xml version="1.0" encoding="utf-8"?>
+<file path=ppt/slides/slide18.xml><?xml version="1.0" encoding="utf-8"?>
 <p:sld xmlns:a="http://schemas.openxmlformats.org/drawingml/2006/main" xmlns:r="http://schemas.openxmlformats.org/officeDocument/2006/relationships" xmlns:p="http://schemas.openxmlformats.org/presentationml/2006/main">
   <p:cSld>
     <p:spTree>
@@ -7027,7 +7399,7 @@
 </p:sld>
 </file>
 
-<file path=ppt/slides/slide18.xml><?xml version="1.0" encoding="utf-8"?>
+<file path=ppt/slides/slide19.xml><?xml version="1.0" encoding="utf-8"?>
 <p:sld xmlns:a="http://schemas.openxmlformats.org/drawingml/2006/main" xmlns:r="http://schemas.openxmlformats.org/officeDocument/2006/relationships" xmlns:p="http://schemas.openxmlformats.org/presentationml/2006/main">
   <p:cSld>
     <p:spTree>
@@ -7163,189 +7535,6 @@
 </p:sld>
 </file>
 
-<file path=ppt/slides/slide19.xml><?xml version="1.0" encoding="utf-8"?>
-<p:sld xmlns:a="http://schemas.openxmlformats.org/drawingml/2006/main" xmlns:r="http://schemas.openxmlformats.org/officeDocument/2006/relationships" xmlns:p="http://schemas.openxmlformats.org/presentationml/2006/main">
-  <p:cSld>
-    <p:spTree>
-      <p:nvGrpSpPr>
-        <p:cNvPr id="1" name=""/>
-        <p:cNvGrpSpPr/>
-        <p:nvPr/>
-      </p:nvGrpSpPr>
-      <p:grpSpPr>
-        <a:xfrm>
-          <a:off x="0" y="0"/>
-          <a:ext cx="0" cy="0"/>
-          <a:chOff x="0" y="0"/>
-          <a:chExt cx="0" cy="0"/>
-        </a:xfrm>
-      </p:grpSpPr>
-      <p:sp>
-        <p:nvSpPr>
-          <p:cNvPr id="2" name="標題 1"/>
-          <p:cNvSpPr>
-            <a:spLocks noGrp="1"/>
-          </p:cNvSpPr>
-          <p:nvPr>
-            <p:ph type="title"/>
-          </p:nvPr>
-        </p:nvSpPr>
-        <p:spPr/>
-        <p:txBody>
-          <a:bodyPr/>
-          <a:lstStyle/>
-          <a:p>
-            <a:r>
-              <a:rPr lang="en-US" altLang="zh-TW" dirty="0" smtClean="0"/>
-              <a:t>Part II points</a:t>
-            </a:r>
-            <a:endParaRPr lang="zh-TW" altLang="en-US" dirty="0"/>
-          </a:p>
-        </p:txBody>
-      </p:sp>
-      <p:sp>
-        <p:nvSpPr>
-          <p:cNvPr id="3" name="內容版面配置區 2"/>
-          <p:cNvSpPr>
-            <a:spLocks noGrp="1"/>
-          </p:cNvSpPr>
-          <p:nvPr>
-            <p:ph idx="1"/>
-          </p:nvPr>
-        </p:nvSpPr>
-        <p:spPr/>
-        <p:txBody>
-          <a:bodyPr>
-            <a:normAutofit lnSpcReduction="10000"/>
-          </a:bodyPr>
-          <a:lstStyle/>
-          <a:p>
-            <a:r>
-              <a:rPr lang="en-US" altLang="zh-TW" b="1" dirty="0"/>
-              <a:t>[SOCKS Server : BIND]</a:t>
-            </a:r>
-            <a:r>
-              <a:rPr lang="en-US" altLang="zh-TW" dirty="0"/>
-              <a:t>	</a:t>
-            </a:r>
-            <a:r>
-              <a:rPr lang="en-US" altLang="zh-TW" dirty="0" smtClean="0"/>
-              <a:t> (</a:t>
-            </a:r>
-            <a:r>
-              <a:rPr lang="en-US" altLang="zh-TW" dirty="0"/>
-              <a:t>15 points</a:t>
-            </a:r>
-            <a:r>
-              <a:rPr lang="en-US" altLang="zh-TW" dirty="0" smtClean="0"/>
-              <a:t>)</a:t>
-            </a:r>
-            <a:endParaRPr lang="en-US" altLang="zh-TW" dirty="0"/>
-          </a:p>
-          <a:p>
-            <a:pPr lvl="1"/>
-            <a:r>
-              <a:rPr lang="en-US" altLang="zh-TW" dirty="0" smtClean="0"/>
-              <a:t>Open </a:t>
-            </a:r>
-            <a:r>
-              <a:rPr lang="en-US" altLang="zh-TW" dirty="0" err="1" smtClean="0"/>
-              <a:t>FlashFXP</a:t>
-            </a:r>
-            <a:r>
-              <a:rPr lang="en-US" altLang="zh-TW" dirty="0" smtClean="0"/>
-              <a:t> and set your socks server</a:t>
-            </a:r>
-          </a:p>
-          <a:p>
-            <a:pPr lvl="1"/>
-            <a:r>
-              <a:rPr lang="en-US" altLang="zh-TW" dirty="0" smtClean="0"/>
-              <a:t>Connect to ftp server, and upload/download file &gt; 1GB. </a:t>
-            </a:r>
-          </a:p>
-          <a:p>
-            <a:pPr lvl="2"/>
-            <a:r>
-              <a:rPr lang="en-US" altLang="zh-TW" dirty="0" smtClean="0"/>
-              <a:t>E.g. Ubuntu 16.04 </a:t>
-            </a:r>
-            <a:r>
-              <a:rPr lang="en-US" altLang="zh-TW" dirty="0" err="1" smtClean="0"/>
-              <a:t>iso</a:t>
-            </a:r>
-            <a:r>
-              <a:rPr lang="en-US" altLang="zh-TW" dirty="0" smtClean="0"/>
-              <a:t> (</a:t>
-            </a:r>
-            <a:r>
-              <a:rPr lang="en-US" altLang="zh-TW" dirty="0" smtClean="0">
-                <a:hlinkClick r:id="rId2"/>
-              </a:rPr>
-              <a:t>download link</a:t>
-            </a:r>
-            <a:r>
-              <a:rPr lang="en-US" altLang="zh-TW" dirty="0" smtClean="0"/>
-              <a:t>)</a:t>
-            </a:r>
-          </a:p>
-          <a:p>
-            <a:pPr lvl="2"/>
-            <a:r>
-              <a:rPr lang="en-US" altLang="zh-TW" dirty="0" smtClean="0"/>
-              <a:t>Upload/Download file and check whether the size remains the same and be able to open (5 points each)</a:t>
-            </a:r>
-          </a:p>
-          <a:p>
-            <a:pPr lvl="1"/>
-            <a:r>
-              <a:rPr lang="en-US" altLang="zh-TW" dirty="0" smtClean="0"/>
-              <a:t>Check </a:t>
-            </a:r>
-            <a:r>
-              <a:rPr lang="en-US" altLang="zh-TW" dirty="0"/>
-              <a:t>whether</a:t>
-            </a:r>
-            <a:r>
-              <a:rPr lang="en-US" altLang="zh-TW" dirty="0" smtClean="0"/>
-              <a:t> SOSKS server</a:t>
-            </a:r>
-            <a:r>
-              <a:rPr lang="en-US" altLang="zh-TW" dirty="0" smtClean="0">
-                <a:latin typeface="Arial Unicode MS" panose="020B0604020202020204" pitchFamily="34" charset="-120"/>
-                <a:ea typeface="Arial Unicode MS" panose="020B0604020202020204" pitchFamily="34" charset="-120"/>
-                <a:cs typeface="Arial Unicode MS" panose="020B0604020202020204" pitchFamily="34" charset="-120"/>
-              </a:rPr>
-              <a:t>’s </a:t>
-            </a:r>
-            <a:r>
-              <a:rPr lang="en-US" altLang="zh-TW" dirty="0" smtClean="0"/>
-              <a:t>output has used BIND protocol (5 points)</a:t>
-            </a:r>
-            <a:endParaRPr lang="zh-TW" altLang="zh-TW" dirty="0"/>
-          </a:p>
-        </p:txBody>
-      </p:sp>
-    </p:spTree>
-    <p:extLst>
-      <p:ext uri="{BB962C8B-B14F-4D97-AF65-F5344CB8AC3E}">
-        <p14:creationId xmlns:p14="http://schemas.microsoft.com/office/powerpoint/2010/main" val="2840889185"/>
-      </p:ext>
-    </p:extLst>
-  </p:cSld>
-  <p:clrMapOvr>
-    <a:masterClrMapping/>
-  </p:clrMapOvr>
-  <p:timing>
-    <p:tnLst>
-      <p:par>
-        <p:cTn id="1" dur="indefinite" restart="never" nodeType="tmRoot"/>
-      </p:par>
-    </p:tnLst>
-  </p:timing>
-</p:sld>
-</file>
-
 <file path=ppt/slides/slide2.xml><?xml version="1.0" encoding="utf-8"?>
 <p:sld xmlns:a="http://schemas.openxmlformats.org/drawingml/2006/main" xmlns:r="http://schemas.openxmlformats.org/officeDocument/2006/relationships" xmlns:p="http://schemas.openxmlformats.org/presentationml/2006/main">
   <p:cSld>
@@ -7370,7 +7559,7 @@
             <a:spLocks noGrp="1"/>
           </p:cNvSpPr>
           <p:nvPr>
-            <p:ph type="title"/>
+            <p:ph type="ctrTitle"/>
           </p:nvPr>
         </p:nvSpPr>
         <p:spPr/>
@@ -7379,130 +7568,66 @@
           <a:lstStyle/>
           <a:p>
             <a:r>
-              <a:rPr lang="en-US" altLang="zh-TW" dirty="0" smtClean="0"/>
-              <a:t>Abstract</a:t>
-            </a:r>
-            <a:endParaRPr lang="zh-TW" altLang="en-US" dirty="0"/>
-          </a:p>
-        </p:txBody>
-      </p:sp>
-      <p:sp>
-        <p:nvSpPr>
-          <p:cNvPr id="3" name="內容版面配置區 2"/>
+              <a:rPr lang="en-US" dirty="0" smtClean="0">
+                <a:latin typeface="+mj-ea"/>
+                <a:ea typeface="+mj-ea"/>
+              </a:rPr>
+              <a:t>Project IV: </a:t>
+            </a:r>
+            <a:br>
+              <a:rPr lang="en-US" dirty="0" smtClean="0">
+                <a:latin typeface="+mj-ea"/>
+                <a:ea typeface="+mj-ea"/>
+              </a:rPr>
+            </a:br>
+            <a:r>
+              <a:rPr lang="en-US" dirty="0" smtClean="0">
+                <a:latin typeface="+mj-ea"/>
+                <a:ea typeface="+mj-ea"/>
+              </a:rPr>
+              <a:t>SOCKS4 Server</a:t>
+            </a:r>
+            <a:endParaRPr lang="zh-TW" altLang="en-US" dirty="0">
+              <a:latin typeface="+mj-ea"/>
+              <a:ea typeface="+mj-ea"/>
+            </a:endParaRPr>
+          </a:p>
+        </p:txBody>
+      </p:sp>
+      <p:sp>
+        <p:nvSpPr>
+          <p:cNvPr id="3" name="副標題 2"/>
           <p:cNvSpPr>
             <a:spLocks noGrp="1"/>
           </p:cNvSpPr>
           <p:nvPr>
-            <p:ph idx="1"/>
+            <p:ph type="subTitle" idx="1"/>
           </p:nvPr>
         </p:nvSpPr>
         <p:spPr/>
         <p:txBody>
-          <a:bodyPr>
-            <a:normAutofit fontScale="70000" lnSpcReduction="20000"/>
-          </a:bodyPr>
-          <a:lstStyle/>
+          <a:bodyPr/>
+          <a:lstStyle/>
+          <a:p>
+            <a:r>
+              <a:rPr lang="en-US" altLang="zh-TW" dirty="0" smtClean="0"/>
+              <a:t>Prof. I-Chen Wu</a:t>
+            </a:r>
+          </a:p>
           <a:p>
             <a:r>
               <a:rPr lang="en-US" altLang="zh-TW" dirty="0" smtClean="0">
-                <a:hlinkClick r:id="rId2"/>
+                <a:cs typeface="Times New Roman" pitchFamily="18" charset="0"/>
               </a:rPr>
-              <a:t>SOCKS </a:t>
-            </a:r>
-            <a:r>
-              <a:rPr lang="en-US" altLang="zh-TW" dirty="0">
-                <a:hlinkClick r:id="rId2"/>
-              </a:rPr>
-              <a:t>4 </a:t>
-            </a:r>
-            <a:r>
-              <a:rPr lang="en-US" altLang="zh-TW" dirty="0" smtClean="0">
-                <a:hlinkClick r:id="rId2"/>
-              </a:rPr>
-              <a:t>Protocol</a:t>
-            </a:r>
-            <a:endParaRPr lang="en-US" altLang="zh-TW" dirty="0"/>
-          </a:p>
-          <a:p>
-            <a:r>
-              <a:rPr lang="en-US" altLang="zh-TW" dirty="0" smtClean="0">
-                <a:hlinkClick r:id="rId3"/>
-              </a:rPr>
-              <a:t>SOCKS </a:t>
-            </a:r>
-            <a:r>
-              <a:rPr lang="en-US" altLang="zh-TW" dirty="0">
-                <a:hlinkClick r:id="rId3"/>
-              </a:rPr>
-              <a:t>4a Protocol (</a:t>
-            </a:r>
-            <a:r>
-              <a:rPr lang="en-US" altLang="zh-TW" dirty="0" smtClean="0">
-                <a:hlinkClick r:id="rId3"/>
-              </a:rPr>
-              <a:t>extension)</a:t>
-            </a:r>
-            <a:endParaRPr lang="en-US" altLang="zh-TW" dirty="0"/>
-          </a:p>
-          <a:p>
-            <a:r>
-              <a:rPr lang="en-US" altLang="zh-TW" dirty="0"/>
-              <a:t>In this project, you are asked to implement the </a:t>
-            </a:r>
-            <a:r>
-              <a:rPr lang="en-US" altLang="zh-TW" b="1" dirty="0"/>
-              <a:t>SOCKS 4 firewall protocol</a:t>
-            </a:r>
-            <a:r>
-              <a:rPr lang="en-US" altLang="zh-TW" dirty="0"/>
-              <a:t> in the application layer of the OSI model.</a:t>
-            </a:r>
-          </a:p>
-          <a:p>
-            <a:endParaRPr lang="en-US" altLang="zh-TW" dirty="0"/>
-          </a:p>
-          <a:p>
-            <a:r>
-              <a:rPr lang="en-US" altLang="zh-TW" dirty="0"/>
-              <a:t>SOCKS is similar to a proxy (i.e. intermediary-program) that acts as both server and client for the purpose of making request on behalf of other clients. Because the SOCKS protocol is independent of application protocols, it can be used for many different services: telnet, ftp, www, etc.</a:t>
-            </a:r>
-          </a:p>
-          <a:p>
-            <a:endParaRPr lang="en-US" altLang="zh-TW" dirty="0"/>
-          </a:p>
-          <a:p>
-            <a:r>
-              <a:rPr lang="en-US" altLang="zh-TW" dirty="0"/>
-              <a:t>There are two types of the SOCKS operations (i.e. </a:t>
-            </a:r>
-            <a:r>
-              <a:rPr lang="en-US" altLang="zh-TW" b="1" dirty="0"/>
-              <a:t>CONNECT</a:t>
-            </a:r>
-            <a:r>
-              <a:rPr lang="en-US" altLang="zh-TW" dirty="0"/>
-              <a:t> and </a:t>
-            </a:r>
-            <a:r>
-              <a:rPr lang="en-US" altLang="zh-TW" b="1" dirty="0"/>
-              <a:t>BIND</a:t>
-            </a:r>
-            <a:r>
-              <a:rPr lang="en-US" altLang="zh-TW" dirty="0"/>
-              <a:t>). You have to implement both of them.</a:t>
-            </a:r>
-          </a:p>
-          <a:p>
-            <a:endParaRPr lang="zh-TW" altLang="en-US" dirty="0"/>
+              <a:t>Network Programming</a:t>
+            </a:r>
+            <a:endParaRPr lang="zh-TW" altLang="en-US" dirty="0">
+              <a:cs typeface="Times New Roman" pitchFamily="18" charset="0"/>
+            </a:endParaRPr>
           </a:p>
         </p:txBody>
       </p:sp>
     </p:spTree>
-    <p:extLst>
-      <p:ext uri="{BB962C8B-B14F-4D97-AF65-F5344CB8AC3E}">
-        <p14:creationId xmlns:p14="http://schemas.microsoft.com/office/powerpoint/2010/main" val="956931158"/>
-      </p:ext>
-    </p:extLst>
   </p:cSld>
   <p:clrMapOvr>
     <a:masterClrMapping/>
@@ -7541,6 +7666,189 @@
             <a:spLocks noGrp="1"/>
           </p:cNvSpPr>
           <p:nvPr>
+            <p:ph type="title"/>
+          </p:nvPr>
+        </p:nvSpPr>
+        <p:spPr/>
+        <p:txBody>
+          <a:bodyPr/>
+          <a:lstStyle/>
+          <a:p>
+            <a:r>
+              <a:rPr lang="en-US" altLang="zh-TW" dirty="0" smtClean="0"/>
+              <a:t>Part II points</a:t>
+            </a:r>
+            <a:endParaRPr lang="zh-TW" altLang="en-US" dirty="0"/>
+          </a:p>
+        </p:txBody>
+      </p:sp>
+      <p:sp>
+        <p:nvSpPr>
+          <p:cNvPr id="3" name="內容版面配置區 2"/>
+          <p:cNvSpPr>
+            <a:spLocks noGrp="1"/>
+          </p:cNvSpPr>
+          <p:nvPr>
+            <p:ph idx="1"/>
+          </p:nvPr>
+        </p:nvSpPr>
+        <p:spPr/>
+        <p:txBody>
+          <a:bodyPr>
+            <a:normAutofit lnSpcReduction="10000"/>
+          </a:bodyPr>
+          <a:lstStyle/>
+          <a:p>
+            <a:r>
+              <a:rPr lang="en-US" altLang="zh-TW" b="1" dirty="0"/>
+              <a:t>[SOCKS Server : BIND]</a:t>
+            </a:r>
+            <a:r>
+              <a:rPr lang="en-US" altLang="zh-TW" dirty="0"/>
+              <a:t>	</a:t>
+            </a:r>
+            <a:r>
+              <a:rPr lang="en-US" altLang="zh-TW" dirty="0" smtClean="0"/>
+              <a:t> (</a:t>
+            </a:r>
+            <a:r>
+              <a:rPr lang="en-US" altLang="zh-TW" dirty="0"/>
+              <a:t>15 points</a:t>
+            </a:r>
+            <a:r>
+              <a:rPr lang="en-US" altLang="zh-TW" dirty="0" smtClean="0"/>
+              <a:t>)</a:t>
+            </a:r>
+            <a:endParaRPr lang="en-US" altLang="zh-TW" dirty="0"/>
+          </a:p>
+          <a:p>
+            <a:pPr lvl="1"/>
+            <a:r>
+              <a:rPr lang="en-US" altLang="zh-TW" dirty="0" smtClean="0"/>
+              <a:t>Open </a:t>
+            </a:r>
+            <a:r>
+              <a:rPr lang="en-US" altLang="zh-TW" dirty="0" err="1" smtClean="0"/>
+              <a:t>FlashFXP</a:t>
+            </a:r>
+            <a:r>
+              <a:rPr lang="en-US" altLang="zh-TW" dirty="0" smtClean="0"/>
+              <a:t> and set your socks server</a:t>
+            </a:r>
+          </a:p>
+          <a:p>
+            <a:pPr lvl="1"/>
+            <a:r>
+              <a:rPr lang="en-US" altLang="zh-TW" dirty="0" smtClean="0"/>
+              <a:t>Connect to ftp server, and upload/download file &gt; 1GB. </a:t>
+            </a:r>
+          </a:p>
+          <a:p>
+            <a:pPr lvl="2"/>
+            <a:r>
+              <a:rPr lang="en-US" altLang="zh-TW" dirty="0" smtClean="0"/>
+              <a:t>E.g. Ubuntu 16.04 </a:t>
+            </a:r>
+            <a:r>
+              <a:rPr lang="en-US" altLang="zh-TW" dirty="0" err="1" smtClean="0"/>
+              <a:t>iso</a:t>
+            </a:r>
+            <a:r>
+              <a:rPr lang="en-US" altLang="zh-TW" dirty="0" smtClean="0"/>
+              <a:t> (</a:t>
+            </a:r>
+            <a:r>
+              <a:rPr lang="en-US" altLang="zh-TW" dirty="0" smtClean="0">
+                <a:hlinkClick r:id="rId2"/>
+              </a:rPr>
+              <a:t>download link</a:t>
+            </a:r>
+            <a:r>
+              <a:rPr lang="en-US" altLang="zh-TW" dirty="0" smtClean="0"/>
+              <a:t>)</a:t>
+            </a:r>
+          </a:p>
+          <a:p>
+            <a:pPr lvl="2"/>
+            <a:r>
+              <a:rPr lang="en-US" altLang="zh-TW" dirty="0" smtClean="0"/>
+              <a:t>Upload/Download file and check whether the size remains the same and be able to open (5 points each)</a:t>
+            </a:r>
+          </a:p>
+          <a:p>
+            <a:pPr lvl="1"/>
+            <a:r>
+              <a:rPr lang="en-US" altLang="zh-TW" dirty="0" smtClean="0"/>
+              <a:t>Check </a:t>
+            </a:r>
+            <a:r>
+              <a:rPr lang="en-US" altLang="zh-TW" dirty="0"/>
+              <a:t>whether</a:t>
+            </a:r>
+            <a:r>
+              <a:rPr lang="en-US" altLang="zh-TW" dirty="0" smtClean="0"/>
+              <a:t> SOSKS server</a:t>
+            </a:r>
+            <a:r>
+              <a:rPr lang="en-US" altLang="zh-TW" dirty="0" smtClean="0">
+                <a:latin typeface="Arial Unicode MS" panose="020B0604020202020204" pitchFamily="34" charset="-120"/>
+                <a:ea typeface="Arial Unicode MS" panose="020B0604020202020204" pitchFamily="34" charset="-120"/>
+                <a:cs typeface="Arial Unicode MS" panose="020B0604020202020204" pitchFamily="34" charset="-120"/>
+              </a:rPr>
+              <a:t>’s </a:t>
+            </a:r>
+            <a:r>
+              <a:rPr lang="en-US" altLang="zh-TW" dirty="0" smtClean="0"/>
+              <a:t>output has used BIND protocol (5 points)</a:t>
+            </a:r>
+            <a:endParaRPr lang="zh-TW" altLang="zh-TW" dirty="0"/>
+          </a:p>
+        </p:txBody>
+      </p:sp>
+    </p:spTree>
+    <p:extLst>
+      <p:ext uri="{BB962C8B-B14F-4D97-AF65-F5344CB8AC3E}">
+        <p14:creationId xmlns:p14="http://schemas.microsoft.com/office/powerpoint/2010/main" val="2840889185"/>
+      </p:ext>
+    </p:extLst>
+  </p:cSld>
+  <p:clrMapOvr>
+    <a:masterClrMapping/>
+  </p:clrMapOvr>
+  <p:timing>
+    <p:tnLst>
+      <p:par>
+        <p:cTn id="1" dur="indefinite" restart="never" nodeType="tmRoot"/>
+      </p:par>
+    </p:tnLst>
+  </p:timing>
+</p:sld>
+</file>
+
+<file path=ppt/slides/slide21.xml><?xml version="1.0" encoding="utf-8"?>
+<p:sld xmlns:a="http://schemas.openxmlformats.org/drawingml/2006/main" xmlns:r="http://schemas.openxmlformats.org/officeDocument/2006/relationships" xmlns:p="http://schemas.openxmlformats.org/presentationml/2006/main">
+  <p:cSld>
+    <p:spTree>
+      <p:nvGrpSpPr>
+        <p:cNvPr id="1" name=""/>
+        <p:cNvGrpSpPr/>
+        <p:nvPr/>
+      </p:nvGrpSpPr>
+      <p:grpSpPr>
+        <a:xfrm>
+          <a:off x="0" y="0"/>
+          <a:ext cx="0" cy="0"/>
+          <a:chOff x="0" y="0"/>
+          <a:chExt cx="0" cy="0"/>
+        </a:xfrm>
+      </p:grpSpPr>
+      <p:sp>
+        <p:nvSpPr>
+          <p:cNvPr id="2" name="標題 1"/>
+          <p:cNvSpPr>
+            <a:spLocks noGrp="1"/>
+          </p:cNvSpPr>
+          <p:nvPr>
             <p:ph type="ctrTitle"/>
           </p:nvPr>
         </p:nvSpPr>
@@ -7596,7 +7904,7 @@
 </p:sld>
 </file>
 
-<file path=ppt/slides/slide21.xml><?xml version="1.0" encoding="utf-8"?>
+<file path=ppt/slides/slide22.xml><?xml version="1.0" encoding="utf-8"?>
 <p:sld xmlns:a="http://schemas.openxmlformats.org/drawingml/2006/main" xmlns:r="http://schemas.openxmlformats.org/officeDocument/2006/relationships" xmlns:p="http://schemas.openxmlformats.org/presentationml/2006/main">
   <p:cSld>
     <p:spTree>
@@ -8609,7 +8917,7 @@
 </p:sld>
 </file>
 
-<file path=ppt/slides/slide22.xml><?xml version="1.0" encoding="utf-8"?>
+<file path=ppt/slides/slide23.xml><?xml version="1.0" encoding="utf-8"?>
 <p:sld xmlns:a="http://schemas.openxmlformats.org/drawingml/2006/main" xmlns:r="http://schemas.openxmlformats.org/officeDocument/2006/relationships" xmlns:p="http://schemas.openxmlformats.org/presentationml/2006/main">
   <p:cSld>
     <p:spTree>
@@ -9635,7 +9943,7 @@
 </p:sld>
 </file>
 
-<file path=ppt/slides/slide23.xml><?xml version="1.0" encoding="utf-8"?>
+<file path=ppt/slides/slide24.xml><?xml version="1.0" encoding="utf-8"?>
 <p:sld xmlns:a="http://schemas.openxmlformats.org/drawingml/2006/main" xmlns:r="http://schemas.openxmlformats.org/officeDocument/2006/relationships" xmlns:p="http://schemas.openxmlformats.org/presentationml/2006/main">
   <p:cSld>
     <p:spTree>
@@ -9851,7 +10159,7 @@
 </p:sld>
 </file>
 
-<file path=ppt/slides/slide24.xml><?xml version="1.0" encoding="utf-8"?>
+<file path=ppt/slides/slide25.xml><?xml version="1.0" encoding="utf-8"?>
 <p:sld xmlns:a="http://schemas.openxmlformats.org/drawingml/2006/main" xmlns:r="http://schemas.openxmlformats.org/officeDocument/2006/relationships" xmlns:p="http://schemas.openxmlformats.org/presentationml/2006/main">
   <p:cSld>
     <p:spTree>
@@ -10065,7 +10373,7 @@
 </p:sld>
 </file>
 
-<file path=ppt/slides/slide25.xml><?xml version="1.0" encoding="utf-8"?>
+<file path=ppt/slides/slide26.xml><?xml version="1.0" encoding="utf-8"?>
 <p:sld xmlns:a="http://schemas.openxmlformats.org/drawingml/2006/main" xmlns:r="http://schemas.openxmlformats.org/officeDocument/2006/relationships" xmlns:p="http://schemas.openxmlformats.org/presentationml/2006/main">
   <p:cSld>
     <p:spTree>
@@ -10162,11 +10470,7 @@
             </a:r>
             <a:r>
               <a:rPr lang="en-US" altLang="zh-TW" dirty="0" smtClean="0"/>
-              <a:t> to make judgement</a:t>
-            </a:r>
-            <a:r>
-              <a:rPr lang="en-US" altLang="zh-TW" dirty="0" smtClean="0"/>
-              <a:t>. </a:t>
+              <a:t> to make judgement. </a:t>
             </a:r>
             <a:endParaRPr lang="zh-TW" altLang="zh-TW" dirty="0"/>
           </a:p>
@@ -10216,202 +10520,6 @@
 </p:sld>
 </file>
 
-<file path=ppt/slides/slide26.xml><?xml version="1.0" encoding="utf-8"?>
-<p:sld xmlns:a="http://schemas.openxmlformats.org/drawingml/2006/main" xmlns:r="http://schemas.openxmlformats.org/officeDocument/2006/relationships" xmlns:p="http://schemas.openxmlformats.org/presentationml/2006/main">
-  <p:cSld>
-    <p:spTree>
-      <p:nvGrpSpPr>
-        <p:cNvPr id="1" name=""/>
-        <p:cNvGrpSpPr/>
-        <p:nvPr/>
-      </p:nvGrpSpPr>
-      <p:grpSpPr>
-        <a:xfrm>
-          <a:off x="0" y="0"/>
-          <a:ext cx="0" cy="0"/>
-          <a:chOff x="0" y="0"/>
-          <a:chExt cx="0" cy="0"/>
-        </a:xfrm>
-      </p:grpSpPr>
-      <p:sp>
-        <p:nvSpPr>
-          <p:cNvPr id="2" name="標題 1"/>
-          <p:cNvSpPr>
-            <a:spLocks noGrp="1"/>
-          </p:cNvSpPr>
-          <p:nvPr>
-            <p:ph type="title"/>
-          </p:nvPr>
-        </p:nvSpPr>
-        <p:spPr/>
-        <p:txBody>
-          <a:bodyPr/>
-          <a:lstStyle/>
-          <a:p>
-            <a:r>
-              <a:rPr lang="en-US" altLang="zh-TW" dirty="0" smtClean="0"/>
-              <a:t>Part III points</a:t>
-            </a:r>
-            <a:endParaRPr lang="zh-TW" altLang="en-US" dirty="0"/>
-          </a:p>
-        </p:txBody>
-      </p:sp>
-      <p:sp>
-        <p:nvSpPr>
-          <p:cNvPr id="3" name="內容版面配置區 2"/>
-          <p:cNvSpPr>
-            <a:spLocks noGrp="1"/>
-          </p:cNvSpPr>
-          <p:nvPr>
-            <p:ph idx="1"/>
-          </p:nvPr>
-        </p:nvSpPr>
-        <p:spPr/>
-        <p:txBody>
-          <a:bodyPr>
-            <a:normAutofit fontScale="92500" lnSpcReduction="10000"/>
-          </a:bodyPr>
-          <a:lstStyle/>
-          <a:p>
-            <a:r>
-              <a:rPr lang="en-US" altLang="zh-TW" b="1" dirty="0"/>
-              <a:t>[CGI SOCKS Client]	</a:t>
-            </a:r>
-            <a:r>
-              <a:rPr lang="en-US" altLang="zh-TW" dirty="0" smtClean="0"/>
-              <a:t> (</a:t>
-            </a:r>
-            <a:r>
-              <a:rPr lang="en-US" altLang="zh-TW" dirty="0"/>
-              <a:t>25 points</a:t>
-            </a:r>
-            <a:r>
-              <a:rPr lang="en-US" altLang="zh-TW" dirty="0" smtClean="0"/>
-              <a:t>)</a:t>
-            </a:r>
-          </a:p>
-          <a:p>
-            <a:pPr lvl="1"/>
-            <a:r>
-              <a:rPr lang="en-US" altLang="zh-TW" dirty="0" smtClean="0"/>
-              <a:t>Close browser</a:t>
-            </a:r>
-            <a:r>
-              <a:rPr lang="en-US" altLang="zh-TW" dirty="0" smtClean="0">
-                <a:latin typeface="Arial Unicode MS" panose="020B0604020202020204" pitchFamily="34" charset="-120"/>
-                <a:ea typeface="Arial Unicode MS" panose="020B0604020202020204" pitchFamily="34" charset="-120"/>
-                <a:cs typeface="Arial Unicode MS" panose="020B0604020202020204" pitchFamily="34" charset="-120"/>
-              </a:rPr>
-              <a:t>’s</a:t>
-            </a:r>
-            <a:r>
-              <a:rPr lang="en-US" altLang="zh-TW" dirty="0" smtClean="0"/>
-              <a:t> proxy setting</a:t>
-            </a:r>
-          </a:p>
-          <a:p>
-            <a:pPr lvl="1"/>
-            <a:r>
-              <a:rPr lang="en-US" altLang="zh-TW" dirty="0" smtClean="0"/>
-              <a:t>Open your http server, connect to form_get2.html</a:t>
-            </a:r>
-          </a:p>
-          <a:p>
-            <a:pPr lvl="1"/>
-            <a:r>
-              <a:rPr lang="en-US" altLang="zh-TW" dirty="0" smtClean="0"/>
-              <a:t>Key in IP, port, filename, </a:t>
-            </a:r>
-            <a:r>
-              <a:rPr lang="en-US" altLang="zh-TW" dirty="0" err="1" smtClean="0"/>
-              <a:t>SocksIP</a:t>
-            </a:r>
-            <a:r>
-              <a:rPr lang="en-US" altLang="zh-TW" dirty="0" smtClean="0"/>
-              <a:t>, </a:t>
-            </a:r>
-            <a:r>
-              <a:rPr lang="en-US" altLang="zh-TW" dirty="0" err="1" smtClean="0"/>
-              <a:t>SocksPort</a:t>
-            </a:r>
-            <a:endParaRPr lang="en-US" altLang="zh-TW" dirty="0" smtClean="0"/>
-          </a:p>
-          <a:p>
-            <a:pPr lvl="1"/>
-            <a:r>
-              <a:rPr lang="en-US" altLang="zh-TW" dirty="0" smtClean="0"/>
-              <a:t>Connect to 5 </a:t>
-            </a:r>
-            <a:r>
-              <a:rPr lang="en-US" altLang="zh-TW" dirty="0" err="1" smtClean="0"/>
-              <a:t>ras</a:t>
-            </a:r>
-            <a:r>
-              <a:rPr lang="en-US" altLang="zh-TW" dirty="0" smtClean="0"/>
-              <a:t>/</a:t>
-            </a:r>
-            <a:r>
-              <a:rPr lang="en-US" altLang="zh-TW" dirty="0" err="1" smtClean="0"/>
-              <a:t>rwg</a:t>
-            </a:r>
-            <a:r>
-              <a:rPr lang="en-US" altLang="zh-TW" dirty="0" smtClean="0"/>
-              <a:t> server through socks sever and check the output</a:t>
-            </a:r>
-            <a:r>
-              <a:rPr lang="en-US" altLang="zh-TW" dirty="0"/>
-              <a:t> </a:t>
-            </a:r>
-            <a:endParaRPr lang="zh-TW" altLang="zh-TW" dirty="0"/>
-          </a:p>
-          <a:p>
-            <a:r>
-              <a:rPr lang="en-US" altLang="zh-TW" dirty="0"/>
-              <a:t>Test Case </a:t>
-            </a:r>
-            <a:r>
-              <a:rPr lang="en-US" altLang="zh-TW" dirty="0" smtClean="0"/>
-              <a:t>(as same </a:t>
-            </a:r>
-            <a:r>
-              <a:rPr lang="en-US" altLang="zh-TW" dirty="0"/>
-              <a:t>as Project </a:t>
-            </a:r>
-            <a:r>
-              <a:rPr lang="en-US" altLang="zh-TW" dirty="0" smtClean="0"/>
-              <a:t>III, no hidden test case) </a:t>
-            </a:r>
-          </a:p>
-          <a:p>
-            <a:pPr lvl="1"/>
-            <a:r>
-              <a:rPr lang="en-US" altLang="zh-TW" dirty="0" smtClean="0"/>
-              <a:t>t1.txt~t5.txt (5 points each)</a:t>
-            </a:r>
-            <a:endParaRPr lang="zh-TW" altLang="zh-TW" dirty="0"/>
-          </a:p>
-        </p:txBody>
-      </p:sp>
-    </p:spTree>
-    <p:extLst>
-      <p:ext uri="{BB962C8B-B14F-4D97-AF65-F5344CB8AC3E}">
-        <p14:creationId xmlns:p14="http://schemas.microsoft.com/office/powerpoint/2010/main" val="719272831"/>
-      </p:ext>
-    </p:extLst>
-  </p:cSld>
-  <p:clrMapOvr>
-    <a:masterClrMapping/>
-  </p:clrMapOvr>
-  <p:timing>
-    <p:tnLst>
-      <p:par>
-        <p:cTn id="1" dur="indefinite" restart="never" nodeType="tmRoot"/>
-      </p:par>
-    </p:tnLst>
-  </p:timing>
-</p:sld>
-</file>
-
 <file path=ppt/slides/slide27.xml><?xml version="1.0" encoding="utf-8"?>
 <p:sld xmlns:a="http://schemas.openxmlformats.org/drawingml/2006/main" xmlns:r="http://schemas.openxmlformats.org/officeDocument/2006/relationships" xmlns:p="http://schemas.openxmlformats.org/presentationml/2006/main">
   <p:cSld>
@@ -10446,7 +10554,7 @@
           <a:p>
             <a:r>
               <a:rPr lang="en-US" altLang="zh-TW" dirty="0" smtClean="0"/>
-              <a:t>Firewall</a:t>
+              <a:t>Part III points</a:t>
             </a:r>
             <a:endParaRPr lang="zh-TW" altLang="en-US" dirty="0"/>
           </a:p>
@@ -10465,21 +10573,21 @@
         <p:spPr/>
         <p:txBody>
           <a:bodyPr>
-            <a:normAutofit/>
+            <a:normAutofit fontScale="92500" lnSpcReduction="10000"/>
           </a:bodyPr>
           <a:lstStyle/>
           <a:p>
             <a:r>
               <a:rPr lang="en-US" altLang="zh-TW" b="1" dirty="0"/>
-              <a:t>[Firewall</a:t>
-            </a:r>
-            <a:r>
-              <a:rPr lang="en-US" altLang="zh-TW" b="1" dirty="0" smtClean="0"/>
-              <a:t>]</a:t>
+              <a:t>[CGI SOCKS Client]	</a:t>
+            </a:r>
+            <a:r>
+              <a:rPr lang="en-US" altLang="zh-TW" dirty="0" smtClean="0"/>
+              <a:t> (</a:t>
             </a:r>
             <a:r>
               <a:rPr lang="en-US" altLang="zh-TW" dirty="0"/>
-              <a:t>			(10 points</a:t>
+              <a:t>25 points</a:t>
             </a:r>
             <a:r>
               <a:rPr lang="en-US" altLang="zh-TW" dirty="0" smtClean="0"/>
@@ -10490,11 +10598,45 @@
             <a:pPr lvl="1"/>
             <a:r>
               <a:rPr lang="en-US" altLang="zh-TW" dirty="0" smtClean="0"/>
-              <a:t>Allow any DEST_IPs. “*.*.*.*”in </a:t>
+              <a:t>Close browser</a:t>
+            </a:r>
+            <a:r>
+              <a:rPr lang="en-US" altLang="zh-TW" dirty="0" smtClean="0">
+                <a:latin typeface="Arial Unicode MS" panose="020B0604020202020204" pitchFamily="34" charset="-120"/>
+                <a:ea typeface="Arial Unicode MS" panose="020B0604020202020204" pitchFamily="34" charset="-120"/>
+                <a:cs typeface="Arial Unicode MS" panose="020B0604020202020204" pitchFamily="34" charset="-120"/>
+              </a:rPr>
+              <a:t>’s</a:t>
+            </a:r>
+            <a:r>
+              <a:rPr lang="en-US" altLang="zh-TW" dirty="0" smtClean="0"/>
+              <a:t> proxy setting</a:t>
+            </a:r>
+          </a:p>
+          <a:p>
+            <a:pPr lvl="1"/>
+            <a:r>
+              <a:rPr lang="en-US" altLang="zh-TW" dirty="0" smtClean="0"/>
+              <a:t>Open your http server, connect to form_get2.html</a:t>
+            </a:r>
+          </a:p>
+          <a:p>
+            <a:pPr lvl="1"/>
+            <a:r>
+              <a:rPr lang="en-US" altLang="zh-TW" dirty="0" smtClean="0"/>
+              <a:t>Key in IP, port, filename, </a:t>
             </a:r>
             <a:r>
               <a:rPr lang="en-US" altLang="zh-TW" dirty="0" err="1" smtClean="0"/>
-              <a:t>socks.conf</a:t>
+              <a:t>SocksIP</a:t>
+            </a:r>
+            <a:r>
+              <a:rPr lang="en-US" altLang="zh-TW" dirty="0" smtClean="0"/>
+              <a:t>, </a:t>
+            </a:r>
+            <a:r>
+              <a:rPr lang="en-US" altLang="zh-TW" dirty="0" err="1" smtClean="0"/>
+              <a:t>SocksPort</a:t>
             </a:r>
             <a:endParaRPr lang="en-US" altLang="zh-TW" dirty="0" smtClean="0"/>
           </a:p>
@@ -10502,62 +10644,62 @@
             <a:pPr lvl="1"/>
             <a:r>
               <a:rPr lang="en-US" altLang="zh-TW" dirty="0" smtClean="0"/>
-              <a:t>Only allow connections to NCTU (5 points)</a:t>
-            </a:r>
-          </a:p>
-          <a:p>
-            <a:pPr lvl="2"/>
+              <a:t>Connect to 5 </a:t>
+            </a:r>
+            <a:r>
+              <a:rPr lang="en-US" altLang="zh-TW" dirty="0" err="1" smtClean="0"/>
+              <a:t>ras</a:t>
+            </a:r>
             <a:r>
               <a:rPr lang="en-US" altLang="zh-TW" dirty="0" smtClean="0"/>
-              <a:t>“140.113.*.*”in </a:t>
+              <a:t>/</a:t>
             </a:r>
             <a:r>
               <a:rPr lang="en-US" altLang="zh-TW" dirty="0" err="1" smtClean="0"/>
-              <a:t>socks.conf</a:t>
-            </a:r>
-            <a:endParaRPr lang="en-US" altLang="zh-TW" dirty="0" smtClean="0"/>
+              <a:t>rwg</a:t>
+            </a:r>
+            <a:r>
+              <a:rPr lang="en-US" altLang="zh-TW" dirty="0" smtClean="0"/>
+              <a:t> server through socks sever and check the output</a:t>
+            </a:r>
+            <a:r>
+              <a:rPr lang="en-US" altLang="zh-TW" dirty="0"/>
+              <a:t> </a:t>
+            </a:r>
+            <a:endParaRPr lang="zh-TW" altLang="zh-TW" dirty="0"/>
+          </a:p>
+          <a:p>
+            <a:r>
+              <a:rPr lang="en-US" altLang="zh-TW" dirty="0"/>
+              <a:t>Test Case </a:t>
+            </a:r>
+            <a:r>
+              <a:rPr lang="en-US" altLang="zh-TW" dirty="0" smtClean="0"/>
+              <a:t>(as same </a:t>
+            </a:r>
+            <a:r>
+              <a:rPr lang="en-US" altLang="zh-TW" dirty="0"/>
+              <a:t>as Project </a:t>
+            </a:r>
+            <a:r>
+              <a:rPr lang="en-US" altLang="zh-TW" dirty="0" smtClean="0"/>
+              <a:t>III, no hidden test case) </a:t>
+            </a:r>
           </a:p>
           <a:p>
             <a:pPr lvl="1"/>
             <a:r>
-              <a:rPr lang="en-US" altLang="zh-TW" dirty="0"/>
-              <a:t>Only allow connections to </a:t>
-            </a:r>
-            <a:r>
               <a:rPr lang="en-US" altLang="zh-TW" dirty="0" smtClean="0"/>
-              <a:t>NTHU (5 </a:t>
-            </a:r>
-            <a:r>
-              <a:rPr lang="en-US" altLang="zh-TW" dirty="0"/>
-              <a:t>points)</a:t>
-            </a:r>
-          </a:p>
-          <a:p>
-            <a:pPr lvl="2"/>
-            <a:r>
-              <a:rPr lang="en-US" altLang="zh-TW" dirty="0"/>
-              <a:t>“</a:t>
-            </a:r>
-            <a:r>
-              <a:rPr lang="en-US" altLang="zh-TW" dirty="0" smtClean="0"/>
-              <a:t>140.114.*.*”</a:t>
-            </a:r>
-            <a:r>
-              <a:rPr lang="en-US" altLang="zh-TW" dirty="0"/>
-              <a:t>in </a:t>
-            </a:r>
-            <a:r>
-              <a:rPr lang="en-US" altLang="zh-TW" dirty="0" err="1" smtClean="0"/>
-              <a:t>socks.conf</a:t>
-            </a:r>
-            <a:endParaRPr lang="en-US" altLang="zh-TW" dirty="0"/>
+              <a:t>t1.txt~t5.txt (5 points each)</a:t>
+            </a:r>
+            <a:endParaRPr lang="zh-TW" altLang="zh-TW" dirty="0"/>
           </a:p>
         </p:txBody>
       </p:sp>
     </p:spTree>
     <p:extLst>
       <p:ext uri="{BB962C8B-B14F-4D97-AF65-F5344CB8AC3E}">
-        <p14:creationId xmlns:p14="http://schemas.microsoft.com/office/powerpoint/2010/main" val="3038193069"/>
+        <p14:creationId xmlns:p14="http://schemas.microsoft.com/office/powerpoint/2010/main" val="719272831"/>
       </p:ext>
     </p:extLst>
   </p:cSld>
@@ -10593,12 +10735,12 @@
       </p:grpSpPr>
       <p:sp>
         <p:nvSpPr>
-          <p:cNvPr id="5" name="標題 4"/>
+          <p:cNvPr id="2" name="標題 1"/>
           <p:cNvSpPr>
             <a:spLocks noGrp="1"/>
           </p:cNvSpPr>
           <p:nvPr>
-            <p:ph type="ctrTitle"/>
+            <p:ph type="title"/>
           </p:nvPr>
         </p:nvSpPr>
         <p:spPr/>
@@ -10608,7 +10750,7 @@
           <a:p>
             <a:r>
               <a:rPr lang="en-US" altLang="zh-TW" dirty="0" smtClean="0"/>
-              <a:t>END</a:t>
+              <a:t>Firewall</a:t>
             </a:r>
             <a:endParaRPr lang="zh-TW" altLang="en-US" dirty="0"/>
           </a:p>
@@ -10621,19 +10763,107 @@
             <a:spLocks noGrp="1"/>
           </p:cNvSpPr>
           <p:nvPr>
-            <p:ph type="subTitle" idx="1"/>
+            <p:ph idx="1"/>
           </p:nvPr>
         </p:nvSpPr>
         <p:spPr/>
         <p:txBody>
-          <a:bodyPr/>
-          <a:lstStyle/>
-          <a:p>
-            <a:endParaRPr lang="zh-TW" altLang="en-US" dirty="0"/>
+          <a:bodyPr>
+            <a:normAutofit/>
+          </a:bodyPr>
+          <a:lstStyle/>
+          <a:p>
+            <a:r>
+              <a:rPr lang="en-US" altLang="zh-TW" b="1" dirty="0"/>
+              <a:t>[Firewall</a:t>
+            </a:r>
+            <a:r>
+              <a:rPr lang="en-US" altLang="zh-TW" b="1" dirty="0" smtClean="0"/>
+              <a:t>]</a:t>
+            </a:r>
+            <a:r>
+              <a:rPr lang="en-US" altLang="zh-TW" dirty="0"/>
+              <a:t>			(10 points</a:t>
+            </a:r>
+            <a:r>
+              <a:rPr lang="en-US" altLang="zh-TW" dirty="0" smtClean="0"/>
+              <a:t>)</a:t>
+            </a:r>
+          </a:p>
+          <a:p>
+            <a:pPr lvl="1"/>
+            <a:r>
+              <a:rPr lang="en-US" altLang="zh-TW" dirty="0" smtClean="0"/>
+              <a:t>Allow any DEST_IPs. “*.*.*.*”in </a:t>
+            </a:r>
+            <a:r>
+              <a:rPr lang="en-US" altLang="zh-TW" dirty="0" err="1" smtClean="0"/>
+              <a:t>socks.conf</a:t>
+            </a:r>
+            <a:endParaRPr lang="en-US" altLang="zh-TW" dirty="0" smtClean="0"/>
+          </a:p>
+          <a:p>
+            <a:pPr lvl="1"/>
+            <a:r>
+              <a:rPr lang="en-US" altLang="zh-TW" dirty="0" smtClean="0"/>
+              <a:t>Only allow connections to NCTU (5 points)</a:t>
+            </a:r>
+          </a:p>
+          <a:p>
+            <a:pPr lvl="2"/>
+            <a:r>
+              <a:rPr lang="en-US" altLang="zh-TW" dirty="0" smtClean="0"/>
+              <a:t>“140.113.*.*”in </a:t>
+            </a:r>
+            <a:r>
+              <a:rPr lang="en-US" altLang="zh-TW" dirty="0" err="1" smtClean="0"/>
+              <a:t>socks.conf</a:t>
+            </a:r>
+            <a:endParaRPr lang="en-US" altLang="zh-TW" dirty="0" smtClean="0"/>
+          </a:p>
+          <a:p>
+            <a:pPr lvl="1"/>
+            <a:r>
+              <a:rPr lang="en-US" altLang="zh-TW" dirty="0"/>
+              <a:t>Only allow connections to </a:t>
+            </a:r>
+            <a:r>
+              <a:rPr lang="en-US" altLang="zh-TW" dirty="0" smtClean="0"/>
+              <a:t>NTHU (5 </a:t>
+            </a:r>
+            <a:r>
+              <a:rPr lang="en-US" altLang="zh-TW" dirty="0"/>
+              <a:t>points)</a:t>
+            </a:r>
+          </a:p>
+          <a:p>
+            <a:pPr lvl="2"/>
+            <a:r>
+              <a:rPr lang="en-US" altLang="zh-TW" dirty="0"/>
+              <a:t>“</a:t>
+            </a:r>
+            <a:r>
+              <a:rPr lang="en-US" altLang="zh-TW" dirty="0" smtClean="0"/>
+              <a:t>140.114.*.*”</a:t>
+            </a:r>
+            <a:r>
+              <a:rPr lang="en-US" altLang="zh-TW" dirty="0"/>
+              <a:t>in </a:t>
+            </a:r>
+            <a:r>
+              <a:rPr lang="en-US" altLang="zh-TW" dirty="0" err="1" smtClean="0"/>
+              <a:t>socks.conf</a:t>
+            </a:r>
+            <a:endParaRPr lang="en-US" altLang="zh-TW" dirty="0"/>
           </a:p>
         </p:txBody>
       </p:sp>
     </p:spTree>
+    <p:extLst>
+      <p:ext uri="{BB962C8B-B14F-4D97-AF65-F5344CB8AC3E}">
+        <p14:creationId xmlns:p14="http://schemas.microsoft.com/office/powerpoint/2010/main" val="3038193069"/>
+      </p:ext>
+    </p:extLst>
   </p:cSld>
   <p:clrMapOvr>
     <a:masterClrMapping/>
@@ -10667,7 +10897,7 @@
       </p:grpSpPr>
       <p:sp>
         <p:nvSpPr>
-          <p:cNvPr id="2" name="標題 1"/>
+          <p:cNvPr id="5" name="標題 4"/>
           <p:cNvSpPr>
             <a:spLocks noGrp="1"/>
           </p:cNvSpPr>
@@ -10682,14 +10912,7 @@
           <a:p>
             <a:r>
               <a:rPr lang="en-US" altLang="zh-TW" dirty="0" smtClean="0"/>
-              <a:t>Implementation</a:t>
-            </a:r>
-            <a:br>
-              <a:rPr lang="en-US" altLang="zh-TW" dirty="0" smtClean="0"/>
-            </a:br>
-            <a:r>
-              <a:rPr lang="en-US" altLang="zh-TW" dirty="0" smtClean="0"/>
-              <a:t>Details</a:t>
+              <a:t>END</a:t>
             </a:r>
             <a:endParaRPr lang="zh-TW" altLang="en-US" dirty="0"/>
           </a:p>
@@ -10697,7 +10920,7 @@
       </p:sp>
       <p:sp>
         <p:nvSpPr>
-          <p:cNvPr id="4" name="副標題 3"/>
+          <p:cNvPr id="3" name="內容版面配置區 2"/>
           <p:cNvSpPr>
             <a:spLocks noGrp="1"/>
           </p:cNvSpPr>
@@ -10710,16 +10933,11 @@
           <a:bodyPr/>
           <a:lstStyle/>
           <a:p>
-            <a:endParaRPr lang="zh-TW" altLang="en-US"/>
+            <a:endParaRPr lang="zh-TW" altLang="en-US" dirty="0"/>
           </a:p>
         </p:txBody>
       </p:sp>
     </p:spTree>
-    <p:extLst>
-      <p:ext uri="{BB962C8B-B14F-4D97-AF65-F5344CB8AC3E}">
-        <p14:creationId xmlns:p14="http://schemas.microsoft.com/office/powerpoint/2010/main" val="4265002581"/>
-      </p:ext>
-    </p:extLst>
   </p:cSld>
   <p:clrMapOvr>
     <a:masterClrMapping/>
@@ -10768,7 +10986,7 @@
           <a:p>
             <a:r>
               <a:rPr lang="en-US" altLang="zh-TW" dirty="0" smtClean="0"/>
-              <a:t>Requirements</a:t>
+              <a:t>Abstract</a:t>
             </a:r>
             <a:endParaRPr lang="zh-TW" altLang="en-US" dirty="0"/>
           </a:p>
@@ -10787,131 +11005,98 @@
         <p:spPr/>
         <p:txBody>
           <a:bodyPr>
-            <a:normAutofit fontScale="92500" lnSpcReduction="10000"/>
+            <a:normAutofit fontScale="70000" lnSpcReduction="20000"/>
           </a:bodyPr>
           <a:lstStyle/>
           <a:p>
             <a:r>
-              <a:rPr lang="en-US" altLang="zh-TW" dirty="0" smtClean="0"/>
-              <a:t>Code</a:t>
-            </a:r>
-          </a:p>
-          <a:p>
-            <a:pPr lvl="1"/>
-            <a:r>
-              <a:rPr lang="en-US" altLang="zh-TW" dirty="0" smtClean="0"/>
-              <a:t>Part I: </a:t>
-            </a:r>
+              <a:rPr lang="en-US" altLang="zh-TW" dirty="0" smtClean="0">
+                <a:hlinkClick r:id="rId2"/>
+              </a:rPr>
+              <a:t>SOCKS </a:t>
+            </a:r>
+            <a:r>
+              <a:rPr lang="en-US" altLang="zh-TW" dirty="0">
+                <a:hlinkClick r:id="rId2"/>
+              </a:rPr>
+              <a:t>4 </a:t>
+            </a:r>
+            <a:r>
+              <a:rPr lang="en-US" altLang="zh-TW" dirty="0" smtClean="0">
+                <a:hlinkClick r:id="rId2"/>
+              </a:rPr>
+              <a:t>Protocol</a:t>
+            </a:r>
+            <a:endParaRPr lang="en-US" altLang="zh-TW" dirty="0"/>
+          </a:p>
+          <a:p>
+            <a:r>
+              <a:rPr lang="en-US" altLang="zh-TW" dirty="0" smtClean="0">
+                <a:hlinkClick r:id="rId3"/>
+              </a:rPr>
+              <a:t>SOCKS </a:t>
+            </a:r>
+            <a:r>
+              <a:rPr lang="en-US" altLang="zh-TW" dirty="0">
+                <a:hlinkClick r:id="rId3"/>
+              </a:rPr>
+              <a:t>4a Protocol (</a:t>
+            </a:r>
+            <a:r>
+              <a:rPr lang="en-US" altLang="zh-TW" dirty="0" smtClean="0">
+                <a:hlinkClick r:id="rId3"/>
+              </a:rPr>
+              <a:t>extension)</a:t>
+            </a:r>
+            <a:endParaRPr lang="en-US" altLang="zh-TW" dirty="0"/>
+          </a:p>
+          <a:p>
             <a:r>
               <a:rPr lang="en-US" altLang="zh-TW" dirty="0"/>
-              <a:t>Socks4 Server </a:t>
-            </a:r>
-            <a:r>
-              <a:rPr lang="en-US" altLang="zh-TW" dirty="0">
-                <a:solidFill>
-                  <a:srgbClr val="FF0000"/>
-                </a:solidFill>
-              </a:rPr>
-              <a:t>Connect</a:t>
+              <a:t>In this project, you are asked to implement the </a:t>
+            </a:r>
+            <a:r>
+              <a:rPr lang="en-US" altLang="zh-TW" b="1" dirty="0"/>
+              <a:t>SOCKS 4 firewall protocol</a:t>
             </a:r>
             <a:r>
               <a:rPr lang="en-US" altLang="zh-TW" dirty="0"/>
-              <a:t> </a:t>
-            </a:r>
-            <a:r>
-              <a:rPr lang="en-US" altLang="zh-TW" dirty="0" smtClean="0"/>
-              <a:t>Mode</a:t>
-            </a:r>
-          </a:p>
-          <a:p>
-            <a:pPr lvl="1"/>
+              <a:t> in the application layer of the OSI model.</a:t>
+            </a:r>
+          </a:p>
+          <a:p>
+            <a:endParaRPr lang="en-US" altLang="zh-TW" dirty="0"/>
+          </a:p>
+          <a:p>
             <a:r>
               <a:rPr lang="en-US" altLang="zh-TW" dirty="0"/>
-              <a:t>Part II: Socks4 Server </a:t>
-            </a:r>
-            <a:r>
-              <a:rPr lang="en-US" altLang="zh-TW" dirty="0">
-                <a:solidFill>
-                  <a:srgbClr val="FF0000"/>
-                </a:solidFill>
-              </a:rPr>
-              <a:t>Bind</a:t>
-            </a:r>
+              <a:t>SOCKS is similar to a proxy (i.e. intermediary-program) that acts as both server and client for the purpose of making request on behalf of other clients. Because the SOCKS protocol is independent of application protocols, it can be used for many different services: telnet, ftp, www, etc.</a:t>
+            </a:r>
+          </a:p>
+          <a:p>
+            <a:endParaRPr lang="en-US" altLang="zh-TW" dirty="0"/>
+          </a:p>
+          <a:p>
             <a:r>
               <a:rPr lang="en-US" altLang="zh-TW" dirty="0"/>
-              <a:t> </a:t>
-            </a:r>
-            <a:r>
-              <a:rPr lang="en-US" altLang="zh-TW" dirty="0" smtClean="0"/>
-              <a:t>Mode</a:t>
-            </a:r>
-          </a:p>
-          <a:p>
-            <a:pPr lvl="1"/>
+              <a:t>There are two types of the SOCKS operations (i.e. </a:t>
+            </a:r>
+            <a:r>
+              <a:rPr lang="en-US" altLang="zh-TW" b="1" dirty="0"/>
+              <a:t>CONNECT</a:t>
+            </a:r>
             <a:r>
               <a:rPr lang="en-US" altLang="zh-TW" dirty="0"/>
-              <a:t>Part III: CGI </a:t>
-            </a:r>
-            <a:r>
-              <a:rPr lang="en-US" altLang="zh-TW" dirty="0" smtClean="0"/>
-              <a:t>Proxy</a:t>
-            </a:r>
-          </a:p>
-          <a:p>
-            <a:r>
-              <a:rPr lang="en-US" altLang="zh-TW" dirty="0" smtClean="0"/>
-              <a:t>Others</a:t>
-            </a:r>
-          </a:p>
-          <a:p>
-            <a:pPr lvl="1"/>
-            <a:r>
-              <a:rPr lang="en-US" altLang="zh-TW" dirty="0" smtClean="0"/>
-              <a:t>Name your </a:t>
-            </a:r>
-            <a:r>
-              <a:rPr lang="en-US" altLang="zh-TW" dirty="0" err="1" smtClean="0"/>
-              <a:t>cgi</a:t>
-            </a:r>
-            <a:r>
-              <a:rPr lang="en-US" altLang="zh-TW" dirty="0" smtClean="0"/>
-              <a:t> as hw4.cgi</a:t>
-            </a:r>
-          </a:p>
-          <a:p>
-            <a:pPr lvl="1"/>
-            <a:r>
-              <a:rPr lang="en-US" altLang="zh-TW" dirty="0" smtClean="0"/>
-              <a:t>Wrap your code into .zip (Do not upload test cases and </a:t>
-            </a:r>
-            <a:r>
-              <a:rPr lang="en-US" altLang="zh-TW" dirty="0" err="1" smtClean="0"/>
-              <a:t>git</a:t>
-            </a:r>
-            <a:r>
-              <a:rPr lang="en-US" altLang="zh-TW" dirty="0" smtClean="0"/>
-              <a:t> files)</a:t>
-            </a:r>
-          </a:p>
-          <a:p>
-            <a:pPr lvl="1"/>
-            <a:r>
-              <a:rPr lang="en-US" altLang="zh-TW" dirty="0" smtClean="0"/>
-              <a:t>Use </a:t>
+              <a:t> and </a:t>
+            </a:r>
+            <a:r>
+              <a:rPr lang="en-US" altLang="zh-TW" b="1" dirty="0"/>
+              <a:t>BIND</a:t>
             </a:r>
             <a:r>
               <a:rPr lang="en-US" altLang="zh-TW" dirty="0"/>
-              <a:t>the concurrent, connection-oriented </a:t>
-            </a:r>
-            <a:r>
-              <a:rPr lang="en-US" altLang="zh-TW" dirty="0" smtClean="0"/>
-              <a:t>paradigm</a:t>
-            </a:r>
-            <a:r>
-              <a:rPr lang="en-US" altLang="zh-TW" dirty="0"/>
-              <a:t>.</a:t>
-            </a:r>
-            <a:endParaRPr lang="zh-TW" altLang="zh-TW" dirty="0"/>
+              <a:t>). You have to implement both of them.</a:t>
+            </a:r>
           </a:p>
           <a:p>
             <a:endParaRPr lang="zh-TW" altLang="en-US" dirty="0"/>
@@ -10921,7 +11106,7 @@
     </p:spTree>
     <p:extLst>
       <p:ext uri="{BB962C8B-B14F-4D97-AF65-F5344CB8AC3E}">
-        <p14:creationId xmlns:p14="http://schemas.microsoft.com/office/powerpoint/2010/main" val="3756322286"/>
+        <p14:creationId xmlns:p14="http://schemas.microsoft.com/office/powerpoint/2010/main" val="956931158"/>
       </p:ext>
     </p:extLst>
   </p:cSld>
@@ -10939,6 +11124,92 @@
 </file>
 
 <file path=ppt/slides/slide30.xml><?xml version="1.0" encoding="utf-8"?>
+<p:sld xmlns:a="http://schemas.openxmlformats.org/drawingml/2006/main" xmlns:r="http://schemas.openxmlformats.org/officeDocument/2006/relationships" xmlns:p="http://schemas.openxmlformats.org/presentationml/2006/main">
+  <p:cSld>
+    <p:spTree>
+      <p:nvGrpSpPr>
+        <p:cNvPr id="1" name=""/>
+        <p:cNvGrpSpPr/>
+        <p:nvPr/>
+      </p:nvGrpSpPr>
+      <p:grpSpPr>
+        <a:xfrm>
+          <a:off x="0" y="0"/>
+          <a:ext cx="0" cy="0"/>
+          <a:chOff x="0" y="0"/>
+          <a:chExt cx="0" cy="0"/>
+        </a:xfrm>
+      </p:grpSpPr>
+      <p:sp>
+        <p:nvSpPr>
+          <p:cNvPr id="2" name="標題 1"/>
+          <p:cNvSpPr>
+            <a:spLocks noGrp="1"/>
+          </p:cNvSpPr>
+          <p:nvPr>
+            <p:ph type="ctrTitle"/>
+          </p:nvPr>
+        </p:nvSpPr>
+        <p:spPr/>
+        <p:txBody>
+          <a:bodyPr/>
+          <a:lstStyle/>
+          <a:p>
+            <a:r>
+              <a:rPr lang="en-US" altLang="zh-TW" dirty="0" smtClean="0"/>
+              <a:t>Implementation</a:t>
+            </a:r>
+            <a:br>
+              <a:rPr lang="en-US" altLang="zh-TW" dirty="0" smtClean="0"/>
+            </a:br>
+            <a:r>
+              <a:rPr lang="en-US" altLang="zh-TW" dirty="0" smtClean="0"/>
+              <a:t>Details</a:t>
+            </a:r>
+            <a:endParaRPr lang="zh-TW" altLang="en-US" dirty="0"/>
+          </a:p>
+        </p:txBody>
+      </p:sp>
+      <p:sp>
+        <p:nvSpPr>
+          <p:cNvPr id="4" name="副標題 3"/>
+          <p:cNvSpPr>
+            <a:spLocks noGrp="1"/>
+          </p:cNvSpPr>
+          <p:nvPr>
+            <p:ph type="subTitle" idx="1"/>
+          </p:nvPr>
+        </p:nvSpPr>
+        <p:spPr/>
+        <p:txBody>
+          <a:bodyPr/>
+          <a:lstStyle/>
+          <a:p>
+            <a:endParaRPr lang="zh-TW" altLang="en-US"/>
+          </a:p>
+        </p:txBody>
+      </p:sp>
+    </p:spTree>
+    <p:extLst>
+      <p:ext uri="{BB962C8B-B14F-4D97-AF65-F5344CB8AC3E}">
+        <p14:creationId xmlns:p14="http://schemas.microsoft.com/office/powerpoint/2010/main" val="4265002581"/>
+      </p:ext>
+    </p:extLst>
+  </p:cSld>
+  <p:clrMapOvr>
+    <a:masterClrMapping/>
+  </p:clrMapOvr>
+  <p:timing>
+    <p:tnLst>
+      <p:par>
+        <p:cTn id="1" dur="indefinite" restart="never" nodeType="tmRoot"/>
+      </p:par>
+    </p:tnLst>
+  </p:timing>
+</p:sld>
+</file>
+
+<file path=ppt/slides/slide31.xml><?xml version="1.0" encoding="utf-8"?>
 <p:sld xmlns:a="http://schemas.openxmlformats.org/drawingml/2006/main" xmlns:r="http://schemas.openxmlformats.org/officeDocument/2006/relationships" xmlns:p="http://schemas.openxmlformats.org/presentationml/2006/main">
   <p:cSld>
     <p:spTree>
@@ -11095,7 +11366,7 @@
 </p:sld>
 </file>
 
-<file path=ppt/slides/slide31.xml><?xml version="1.0" encoding="utf-8"?>
+<file path=ppt/slides/slide32.xml><?xml version="1.0" encoding="utf-8"?>
 <p:sld xmlns:a="http://schemas.openxmlformats.org/drawingml/2006/main" xmlns:r="http://schemas.openxmlformats.org/officeDocument/2006/relationships" xmlns:p="http://schemas.openxmlformats.org/presentationml/2006/main">
   <p:cSld>
     <p:spTree>
@@ -11278,7 +11549,7 @@
 </p:sld>
 </file>
 
-<file path=ppt/slides/slide32.xml><?xml version="1.0" encoding="utf-8"?>
+<file path=ppt/slides/slide33.xml><?xml version="1.0" encoding="utf-8"?>
 <p:sld xmlns:a="http://schemas.openxmlformats.org/drawingml/2006/main" xmlns:r="http://schemas.openxmlformats.org/officeDocument/2006/relationships" xmlns:p="http://schemas.openxmlformats.org/presentationml/2006/main">
   <p:cSld>
     <p:spTree>
@@ -11435,7 +11706,7 @@
 </p:sld>
 </file>
 
-<file path=ppt/slides/slide33.xml><?xml version="1.0" encoding="utf-8"?>
+<file path=ppt/slides/slide34.xml><?xml version="1.0" encoding="utf-8"?>
 <p:sld xmlns:a="http://schemas.openxmlformats.org/drawingml/2006/main" xmlns:r="http://schemas.openxmlformats.org/officeDocument/2006/relationships" xmlns:p="http://schemas.openxmlformats.org/presentationml/2006/main">
   <p:cSld>
     <p:spTree>
@@ -11682,7 +11953,7 @@
 </p:sld>
 </file>
 
-<file path=ppt/slides/slide34.xml><?xml version="1.0" encoding="utf-8"?>
+<file path=ppt/slides/slide35.xml><?xml version="1.0" encoding="utf-8"?>
 <p:sld xmlns:a="http://schemas.openxmlformats.org/drawingml/2006/main" xmlns:r="http://schemas.openxmlformats.org/officeDocument/2006/relationships" xmlns:p="http://schemas.openxmlformats.org/presentationml/2006/main">
   <p:cSld>
     <p:spTree>
@@ -12659,7 +12930,7 @@
 </p:sld>
 </file>
 
-<file path=ppt/slides/slide35.xml><?xml version="1.0" encoding="utf-8"?>
+<file path=ppt/slides/slide36.xml><?xml version="1.0" encoding="utf-8"?>
 <p:sld xmlns:a="http://schemas.openxmlformats.org/drawingml/2006/main" xmlns:r="http://schemas.openxmlformats.org/officeDocument/2006/relationships" xmlns:p="http://schemas.openxmlformats.org/presentationml/2006/main">
   <p:cSld>
     <p:spTree>
@@ -13982,421 +14253,6 @@
 </p:sld>
 </file>
 
-<file path=ppt/slides/slide36.xml><?xml version="1.0" encoding="utf-8"?>
-<p:sld xmlns:a="http://schemas.openxmlformats.org/drawingml/2006/main" xmlns:r="http://schemas.openxmlformats.org/officeDocument/2006/relationships" xmlns:p="http://schemas.openxmlformats.org/presentationml/2006/main">
-  <p:cSld>
-    <p:spTree>
-      <p:nvGrpSpPr>
-        <p:cNvPr id="1" name=""/>
-        <p:cNvGrpSpPr/>
-        <p:nvPr/>
-      </p:nvGrpSpPr>
-      <p:grpSpPr>
-        <a:xfrm>
-          <a:off x="0" y="0"/>
-          <a:ext cx="0" cy="0"/>
-          <a:chOff x="0" y="0"/>
-          <a:chExt cx="0" cy="0"/>
-        </a:xfrm>
-      </p:grpSpPr>
-      <p:sp>
-        <p:nvSpPr>
-          <p:cNvPr id="2" name="標題 1"/>
-          <p:cNvSpPr>
-            <a:spLocks noGrp="1"/>
-          </p:cNvSpPr>
-          <p:nvPr>
-            <p:ph type="title"/>
-          </p:nvPr>
-        </p:nvSpPr>
-        <p:spPr/>
-        <p:txBody>
-          <a:bodyPr>
-            <a:normAutofit/>
-          </a:bodyPr>
-          <a:lstStyle/>
-          <a:p>
-            <a:r>
-              <a:rPr lang="en-US" altLang="zh-TW" dirty="0" smtClean="0"/>
-              <a:t>Implementation Details</a:t>
-            </a:r>
-            <a:endParaRPr lang="zh-TW" altLang="en-US" dirty="0"/>
-          </a:p>
-        </p:txBody>
-      </p:sp>
-      <p:sp>
-        <p:nvSpPr>
-          <p:cNvPr id="3" name="內容版面配置區 2"/>
-          <p:cNvSpPr>
-            <a:spLocks noGrp="1"/>
-          </p:cNvSpPr>
-          <p:nvPr>
-            <p:ph idx="1"/>
-          </p:nvPr>
-        </p:nvSpPr>
-        <p:spPr/>
-        <p:txBody>
-          <a:bodyPr>
-            <a:normAutofit fontScale="70000" lnSpcReduction="20000"/>
-          </a:bodyPr>
-          <a:lstStyle/>
-          <a:p>
-            <a:r>
-              <a:rPr lang="en-US" altLang="zh-TW" dirty="0" smtClean="0"/>
-              <a:t>Process</a:t>
-            </a:r>
-            <a:r>
-              <a:rPr lang="zh-TW" altLang="zh-TW" dirty="0" smtClean="0"/>
-              <a:t>：</a:t>
-            </a:r>
-            <a:endParaRPr lang="zh-TW" altLang="zh-TW" dirty="0"/>
-          </a:p>
-          <a:p>
-            <a:pPr lvl="1"/>
-            <a:r>
-              <a:rPr lang="en-US" altLang="zh-TW" dirty="0" smtClean="0"/>
-              <a:t>master socket(listener)</a:t>
-            </a:r>
-            <a:r>
-              <a:rPr lang="zh-TW" altLang="zh-TW" dirty="0" smtClean="0"/>
-              <a:t>不斷地</a:t>
-            </a:r>
-            <a:r>
-              <a:rPr lang="en-US" altLang="zh-TW" dirty="0" smtClean="0"/>
-              <a:t>listen</a:t>
-            </a:r>
-            <a:r>
-              <a:rPr lang="zh-TW" altLang="zh-TW" dirty="0" smtClean="0"/>
-              <a:t>，</a:t>
-            </a:r>
-            <a:r>
-              <a:rPr lang="zh-TW" altLang="zh-TW" dirty="0"/>
-              <a:t>有連線</a:t>
-            </a:r>
-            <a:r>
-              <a:rPr lang="en-US" altLang="zh-TW" dirty="0"/>
-              <a:t>(SRC)</a:t>
-            </a:r>
-            <a:r>
-              <a:rPr lang="zh-TW" altLang="zh-TW" dirty="0"/>
-              <a:t>來就</a:t>
-            </a:r>
-            <a:r>
-              <a:rPr lang="en-US" altLang="zh-TW" dirty="0"/>
-              <a:t>fork</a:t>
-            </a:r>
-            <a:r>
-              <a:rPr lang="zh-TW" altLang="zh-TW" dirty="0"/>
-              <a:t>一個</a:t>
-            </a:r>
-            <a:r>
-              <a:rPr lang="en-US" altLang="zh-TW" dirty="0"/>
-              <a:t>process(SOCKS) </a:t>
-            </a:r>
-            <a:r>
-              <a:rPr lang="zh-TW" altLang="zh-TW" dirty="0"/>
-              <a:t>去處理，然後繼續</a:t>
-            </a:r>
-            <a:r>
-              <a:rPr lang="en-US" altLang="zh-TW" dirty="0"/>
-              <a:t>listen</a:t>
-            </a:r>
-            <a:endParaRPr lang="zh-TW" altLang="zh-TW" dirty="0"/>
-          </a:p>
-          <a:p>
-            <a:pPr lvl="1"/>
-            <a:r>
-              <a:rPr lang="en-US" altLang="zh-TW" dirty="0" smtClean="0"/>
-              <a:t>SOCKS </a:t>
-            </a:r>
-            <a:r>
-              <a:rPr lang="zh-TW" altLang="zh-TW" dirty="0"/>
-              <a:t>與</a:t>
-            </a:r>
-            <a:r>
-              <a:rPr lang="en-US" altLang="zh-TW" dirty="0"/>
-              <a:t>SRC </a:t>
-            </a:r>
-            <a:r>
-              <a:rPr lang="zh-TW" altLang="zh-TW" dirty="0"/>
-              <a:t>連線溝通</a:t>
-            </a:r>
-          </a:p>
-          <a:p>
-            <a:pPr marL="457200" lvl="1" indent="0">
-              <a:buNone/>
-            </a:pPr>
-            <a:r>
-              <a:rPr lang="en-US" altLang="zh-TW" dirty="0"/>
-              <a:t>	</a:t>
-            </a:r>
-            <a:r>
-              <a:rPr lang="en-US" altLang="zh-TW" dirty="0" smtClean="0"/>
-              <a:t>1</a:t>
-            </a:r>
-            <a:r>
-              <a:rPr lang="en-US" altLang="zh-TW" dirty="0"/>
-              <a:t>.</a:t>
-            </a:r>
-            <a:r>
-              <a:rPr lang="zh-TW" altLang="zh-TW" dirty="0"/>
-              <a:t>收</a:t>
-            </a:r>
-            <a:r>
-              <a:rPr lang="en-US" altLang="zh-TW" dirty="0"/>
-              <a:t>SOCKS4_REQUEST</a:t>
-            </a:r>
-            <a:r>
-              <a:rPr lang="zh-TW" altLang="zh-TW" dirty="0"/>
-              <a:t>格式封包</a:t>
-            </a:r>
-          </a:p>
-          <a:p>
-            <a:pPr marL="0" indent="0">
-              <a:buNone/>
-            </a:pPr>
-            <a:r>
-              <a:rPr lang="en-US" altLang="zh-TW" dirty="0"/>
-              <a:t>	</a:t>
-            </a:r>
-            <a:r>
-              <a:rPr lang="en-US" altLang="zh-TW" dirty="0" smtClean="0"/>
-              <a:t>2.check </a:t>
-            </a:r>
-            <a:r>
-              <a:rPr lang="zh-TW" altLang="zh-TW" dirty="0"/>
-              <a:t>是否可以過防火牆</a:t>
-            </a:r>
-            <a:r>
-              <a:rPr lang="en-US" altLang="zh-TW" dirty="0"/>
-              <a:t>(</a:t>
-            </a:r>
-            <a:r>
-              <a:rPr lang="en-US" altLang="zh-TW" dirty="0" err="1"/>
-              <a:t>socks.conf</a:t>
-            </a:r>
-            <a:r>
-              <a:rPr lang="en-US" altLang="zh-TW" dirty="0"/>
-              <a:t>)</a:t>
-            </a:r>
-            <a:r>
-              <a:rPr lang="zh-TW" altLang="zh-TW" dirty="0"/>
-              <a:t>，並回傳</a:t>
-            </a:r>
-            <a:r>
-              <a:rPr lang="en-US" altLang="zh-TW" dirty="0"/>
-              <a:t>SRC </a:t>
-            </a:r>
-            <a:endParaRPr lang="en-US" altLang="zh-TW" dirty="0" smtClean="0"/>
-          </a:p>
-          <a:p>
-            <a:pPr marL="0" indent="0">
-              <a:buNone/>
-            </a:pPr>
-            <a:r>
-              <a:rPr lang="en-US" altLang="zh-TW" dirty="0"/>
-              <a:t>	 </a:t>
-            </a:r>
-            <a:r>
-              <a:rPr lang="en-US" altLang="zh-TW" dirty="0" smtClean="0"/>
-              <a:t>   SOCKS4_REPLY</a:t>
-            </a:r>
-            <a:endParaRPr lang="zh-TW" altLang="zh-TW" dirty="0"/>
-          </a:p>
-          <a:p>
-            <a:pPr lvl="1"/>
-            <a:r>
-              <a:rPr lang="en-US" altLang="zh-TW" dirty="0" smtClean="0"/>
-              <a:t>CONNECT mode</a:t>
-            </a:r>
-            <a:endParaRPr lang="zh-TW" altLang="zh-TW" dirty="0"/>
-          </a:p>
-          <a:p>
-            <a:pPr marL="0" indent="0">
-              <a:buNone/>
-            </a:pPr>
-            <a:r>
-              <a:rPr lang="en-US" altLang="zh-TW" dirty="0"/>
-              <a:t>	</a:t>
-            </a:r>
-            <a:r>
-              <a:rPr lang="en-US" altLang="zh-TW" dirty="0" smtClean="0"/>
-              <a:t>1.</a:t>
-            </a:r>
-            <a:r>
-              <a:rPr lang="zh-TW" altLang="zh-TW" dirty="0"/>
-              <a:t>從</a:t>
-            </a:r>
-            <a:r>
-              <a:rPr lang="en-US" altLang="zh-TW" dirty="0"/>
-              <a:t>REQUEST</a:t>
-            </a:r>
-            <a:r>
-              <a:rPr lang="zh-TW" altLang="zh-TW" dirty="0"/>
-              <a:t>裡取出</a:t>
-            </a:r>
-            <a:r>
-              <a:rPr lang="en-US" altLang="zh-TW" dirty="0" err="1"/>
-              <a:t>dest</a:t>
-            </a:r>
-            <a:r>
-              <a:rPr lang="zh-TW" altLang="zh-TW" dirty="0"/>
-              <a:t>的</a:t>
-            </a:r>
-            <a:r>
-              <a:rPr lang="en-US" altLang="zh-TW" dirty="0"/>
-              <a:t>IP</a:t>
-            </a:r>
-            <a:r>
-              <a:rPr lang="zh-TW" altLang="zh-TW" dirty="0"/>
-              <a:t>與</a:t>
-            </a:r>
-            <a:r>
-              <a:rPr lang="en-US" altLang="zh-TW" dirty="0"/>
-              <a:t>PORT</a:t>
-            </a:r>
-            <a:endParaRPr lang="zh-TW" altLang="zh-TW" dirty="0"/>
-          </a:p>
-          <a:p>
-            <a:pPr marL="0" indent="0">
-              <a:buNone/>
-            </a:pPr>
-            <a:r>
-              <a:rPr lang="en-US" altLang="zh-TW" dirty="0"/>
-              <a:t>	</a:t>
-            </a:r>
-            <a:r>
-              <a:rPr lang="en-US" altLang="zh-TW" dirty="0" smtClean="0"/>
-              <a:t>2.SOCKS</a:t>
-            </a:r>
-            <a:r>
-              <a:rPr lang="zh-TW" altLang="zh-TW" dirty="0"/>
-              <a:t>連線到</a:t>
-            </a:r>
-            <a:r>
-              <a:rPr lang="en-US" altLang="zh-TW" dirty="0"/>
-              <a:t>DEST</a:t>
-            </a:r>
-            <a:endParaRPr lang="zh-TW" altLang="zh-TW" dirty="0"/>
-          </a:p>
-          <a:p>
-            <a:pPr marL="0" indent="0">
-              <a:buNone/>
-            </a:pPr>
-            <a:r>
-              <a:rPr lang="en-US" altLang="zh-TW" dirty="0"/>
-              <a:t>	3</a:t>
-            </a:r>
-            <a:r>
-              <a:rPr lang="en-US" altLang="zh-TW" dirty="0" smtClean="0"/>
-              <a:t>.SOCKS</a:t>
-            </a:r>
-            <a:r>
-              <a:rPr lang="zh-TW" altLang="zh-TW" dirty="0"/>
-              <a:t>幫</a:t>
-            </a:r>
-            <a:r>
-              <a:rPr lang="en-US" altLang="zh-TW" dirty="0"/>
-              <a:t>SRC</a:t>
-            </a:r>
-            <a:r>
-              <a:rPr lang="zh-TW" altLang="zh-TW" dirty="0"/>
-              <a:t>與</a:t>
-            </a:r>
-            <a:r>
-              <a:rPr lang="en-US" altLang="zh-TW" dirty="0"/>
-              <a:t>DEST</a:t>
-            </a:r>
-            <a:r>
-              <a:rPr lang="zh-TW" altLang="zh-TW" dirty="0"/>
-              <a:t>做資料傳導的</a:t>
-            </a:r>
-            <a:r>
-              <a:rPr lang="zh-TW" altLang="zh-TW" dirty="0" smtClean="0"/>
-              <a:t>動作</a:t>
-            </a:r>
-          </a:p>
-          <a:p>
-            <a:pPr marL="0" indent="0">
-              <a:buNone/>
-            </a:pPr>
-            <a:r>
-              <a:rPr lang="en-US" altLang="zh-TW" dirty="0" smtClean="0"/>
-              <a:t>	    </a:t>
-            </a:r>
-            <a:r>
-              <a:rPr lang="zh-TW" altLang="zh-TW" dirty="0" smtClean="0"/>
-              <a:t>－</a:t>
-            </a:r>
-            <a:r>
-              <a:rPr lang="en-US" altLang="zh-TW" dirty="0" smtClean="0"/>
-              <a:t>SRC</a:t>
-            </a:r>
-            <a:r>
-              <a:rPr lang="zh-TW" altLang="zh-TW" dirty="0" smtClean="0"/>
-              <a:t>傳來的資料－＞傳給</a:t>
-            </a:r>
-            <a:r>
-              <a:rPr lang="en-US" altLang="zh-TW" dirty="0" smtClean="0"/>
-              <a:t>DEST</a:t>
-            </a:r>
-            <a:endParaRPr lang="zh-TW" altLang="zh-TW" dirty="0" smtClean="0"/>
-          </a:p>
-          <a:p>
-            <a:pPr marL="0" indent="0">
-              <a:buNone/>
-            </a:pPr>
-            <a:r>
-              <a:rPr lang="en-US" altLang="zh-TW" dirty="0"/>
-              <a:t>	</a:t>
-            </a:r>
-            <a:r>
-              <a:rPr lang="en-US" altLang="zh-TW" dirty="0" smtClean="0"/>
-              <a:t>    </a:t>
-            </a:r>
-            <a:r>
-              <a:rPr lang="zh-TW" altLang="zh-TW" dirty="0" smtClean="0"/>
-              <a:t>－</a:t>
-            </a:r>
-            <a:r>
-              <a:rPr lang="en-US" altLang="zh-TW" dirty="0"/>
-              <a:t>DEST</a:t>
-            </a:r>
-            <a:r>
-              <a:rPr lang="zh-TW" altLang="zh-TW" dirty="0"/>
-              <a:t>傳來的資料－＞傳給</a:t>
-            </a:r>
-            <a:r>
-              <a:rPr lang="en-US" altLang="zh-TW" dirty="0"/>
-              <a:t>SRC</a:t>
-            </a:r>
-            <a:endParaRPr lang="zh-TW" altLang="zh-TW" dirty="0"/>
-          </a:p>
-          <a:p>
-            <a:endParaRPr lang="zh-TW" altLang="en-US" dirty="0"/>
-          </a:p>
-        </p:txBody>
-      </p:sp>
-    </p:spTree>
-    <p:extLst>
-      <p:ext uri="{BB962C8B-B14F-4D97-AF65-F5344CB8AC3E}">
-        <p14:creationId xmlns:p14="http://schemas.microsoft.com/office/powerpoint/2010/main" val="3311866093"/>
-      </p:ext>
-    </p:extLst>
-  </p:cSld>
-  <p:clrMapOvr>
-    <a:masterClrMapping/>
-  </p:clrMapOvr>
-  <p:timing>
-    <p:tnLst>
-      <p:par>
-        <p:cTn id="1" dur="indefinite" restart="never" nodeType="tmRoot"/>
-      </p:par>
-    </p:tnLst>
-  </p:timing>
-</p:sld>
-</file>
-
 <file path=ppt/slides/slide37.xml><?xml version="1.0" encoding="utf-8"?>
 <p:sld xmlns:a="http://schemas.openxmlformats.org/drawingml/2006/main" xmlns:r="http://schemas.openxmlformats.org/officeDocument/2006/relationships" xmlns:p="http://schemas.openxmlformats.org/presentationml/2006/main">
   <p:cSld>
@@ -14426,11 +14282,13 @@
         </p:nvSpPr>
         <p:spPr/>
         <p:txBody>
-          <a:bodyPr/>
-          <a:lstStyle/>
-          <a:p>
-            <a:r>
-              <a:rPr lang="en-US" altLang="zh-TW" dirty="0"/>
+          <a:bodyPr>
+            <a:normAutofit/>
+          </a:bodyPr>
+          <a:lstStyle/>
+          <a:p>
+            <a:r>
+              <a:rPr lang="en-US" altLang="zh-TW" dirty="0" smtClean="0"/>
               <a:t>Implementation Details</a:t>
             </a:r>
             <a:endParaRPr lang="zh-TW" altLang="en-US" dirty="0"/>
@@ -14450,19 +14308,119 @@
         <p:spPr/>
         <p:txBody>
           <a:bodyPr>
-            <a:normAutofit fontScale="85000" lnSpcReduction="10000"/>
+            <a:normAutofit fontScale="70000" lnSpcReduction="20000"/>
           </a:bodyPr>
           <a:lstStyle/>
           <a:p>
             <a:r>
               <a:rPr lang="en-US" altLang="zh-TW" dirty="0" smtClean="0"/>
-              <a:t>BIND mode</a:t>
+              <a:t>Process</a:t>
             </a:r>
             <a:r>
               <a:rPr lang="zh-TW" altLang="zh-TW" dirty="0" smtClean="0"/>
               <a:t>：</a:t>
             </a:r>
             <a:endParaRPr lang="zh-TW" altLang="zh-TW" dirty="0"/>
+          </a:p>
+          <a:p>
+            <a:pPr lvl="1"/>
+            <a:r>
+              <a:rPr lang="en-US" altLang="zh-TW" dirty="0" smtClean="0"/>
+              <a:t>master socket(listener)</a:t>
+            </a:r>
+            <a:r>
+              <a:rPr lang="zh-TW" altLang="zh-TW" dirty="0" smtClean="0"/>
+              <a:t>不斷地</a:t>
+            </a:r>
+            <a:r>
+              <a:rPr lang="en-US" altLang="zh-TW" dirty="0" smtClean="0"/>
+              <a:t>listen</a:t>
+            </a:r>
+            <a:r>
+              <a:rPr lang="zh-TW" altLang="zh-TW" dirty="0" smtClean="0"/>
+              <a:t>，</a:t>
+            </a:r>
+            <a:r>
+              <a:rPr lang="zh-TW" altLang="zh-TW" dirty="0"/>
+              <a:t>有連線</a:t>
+            </a:r>
+            <a:r>
+              <a:rPr lang="en-US" altLang="zh-TW" dirty="0"/>
+              <a:t>(SRC)</a:t>
+            </a:r>
+            <a:r>
+              <a:rPr lang="zh-TW" altLang="zh-TW" dirty="0"/>
+              <a:t>來就</a:t>
+            </a:r>
+            <a:r>
+              <a:rPr lang="en-US" altLang="zh-TW" dirty="0"/>
+              <a:t>fork</a:t>
+            </a:r>
+            <a:r>
+              <a:rPr lang="zh-TW" altLang="zh-TW" dirty="0"/>
+              <a:t>一個</a:t>
+            </a:r>
+            <a:r>
+              <a:rPr lang="en-US" altLang="zh-TW" dirty="0"/>
+              <a:t>process(SOCKS) </a:t>
+            </a:r>
+            <a:r>
+              <a:rPr lang="zh-TW" altLang="zh-TW" dirty="0"/>
+              <a:t>去處理，然後繼續</a:t>
+            </a:r>
+            <a:r>
+              <a:rPr lang="en-US" altLang="zh-TW" dirty="0"/>
+              <a:t>listen</a:t>
+            </a:r>
+            <a:endParaRPr lang="zh-TW" altLang="zh-TW" dirty="0"/>
+          </a:p>
+          <a:p>
+            <a:pPr lvl="1"/>
+            <a:r>
+              <a:rPr lang="en-US" altLang="zh-TW" dirty="0" smtClean="0"/>
+              <a:t>SOCKS </a:t>
+            </a:r>
+            <a:r>
+              <a:rPr lang="zh-TW" altLang="zh-TW" dirty="0"/>
+              <a:t>與</a:t>
+            </a:r>
+            <a:r>
+              <a:rPr lang="en-US" altLang="zh-TW" dirty="0"/>
+              <a:t>SRC </a:t>
+            </a:r>
+            <a:r>
+              <a:rPr lang="zh-TW" altLang="zh-TW" dirty="0"/>
+              <a:t>連線溝通</a:t>
+            </a:r>
+          </a:p>
+          <a:p>
+            <a:pPr marL="457200" lvl="1" indent="0">
+              <a:buNone/>
+            </a:pPr>
+            <a:r>
+              <a:rPr lang="en-US" altLang="zh-TW" dirty="0"/>
+              <a:t>	</a:t>
+            </a:r>
+            <a:r>
+              <a:rPr lang="en-US" altLang="zh-TW" dirty="0" smtClean="0"/>
+              <a:t>1</a:t>
+            </a:r>
+            <a:r>
+              <a:rPr lang="en-US" altLang="zh-TW" dirty="0"/>
+              <a:t>.</a:t>
+            </a:r>
+            <a:r>
+              <a:rPr lang="zh-TW" altLang="zh-TW" dirty="0"/>
+              <a:t>收</a:t>
+            </a:r>
+            <a:r>
+              <a:rPr lang="en-US" altLang="zh-TW" dirty="0"/>
+              <a:t>SOCKS4_REQUEST</a:t>
+            </a:r>
+            <a:r>
+              <a:rPr lang="zh-TW" altLang="zh-TW" dirty="0"/>
+              <a:t>格式封包</a:t>
+            </a:r>
           </a:p>
           <a:p>
             <a:pPr marL="0" indent="0">
@@ -14474,25 +14432,33 @@
             </a:r>
             <a:r>
               <a:rPr lang="en-US" altLang="zh-TW" dirty="0" smtClean="0"/>
-              <a:t>1. SOCKS </a:t>
+              <a:t>2.check </a:t>
             </a:r>
             <a:r>
               <a:rPr lang="zh-TW" altLang="zh-TW" dirty="0"/>
-              <a:t>先去</a:t>
+              <a:t>是否可以過防火牆</a:t>
             </a:r>
             <a:r>
               <a:rPr lang="en-US" altLang="zh-TW" dirty="0"/>
-              <a:t>BIND</a:t>
+              <a:t>(</a:t>
+            </a:r>
+            <a:r>
+              <a:rPr lang="en-US" altLang="zh-TW" dirty="0" err="1"/>
+              <a:t>socks.conf</a:t>
+            </a:r>
+            <a:r>
+              <a:rPr lang="en-US" altLang="zh-TW" dirty="0"/>
+              <a:t>)</a:t>
             </a:r>
             <a:r>
               <a:rPr lang="zh-TW" altLang="zh-TW" dirty="0"/>
-              <a:t>一個</a:t>
+              <a:t>，並回傳</a:t>
             </a:r>
             <a:r>
               <a:rPr lang="en-US" altLang="zh-TW" dirty="0"/>
-              <a:t>port(BIND_PORT)</a:t>
-            </a:r>
-            <a:endParaRPr lang="zh-TW" altLang="zh-TW" dirty="0"/>
+              <a:t>SRC </a:t>
+            </a:r>
+            <a:endParaRPr lang="en-US" altLang="zh-TW" dirty="0" smtClean="0"/>
           </a:p>
           <a:p>
             <a:pPr marL="0" indent="0">
@@ -14500,57 +14466,21 @@
             </a:pPr>
             <a:r>
               <a:rPr lang="en-US" altLang="zh-TW" dirty="0"/>
-              <a:t>	</a:t>
+              <a:t>	 </a:t>
             </a:r>
             <a:r>
               <a:rPr lang="en-US" altLang="zh-TW" dirty="0" smtClean="0"/>
-              <a:t>2. SOCKS </a:t>
-            </a:r>
-            <a:r>
-              <a:rPr lang="en-US" altLang="zh-TW" dirty="0"/>
-              <a:t>listen</a:t>
-            </a:r>
-            <a:r>
-              <a:rPr lang="zh-TW" altLang="zh-TW" dirty="0"/>
-              <a:t>該</a:t>
-            </a:r>
-            <a:r>
-              <a:rPr lang="en-US" altLang="zh-TW" dirty="0"/>
-              <a:t>port</a:t>
-            </a:r>
-            <a:r>
-              <a:rPr lang="zh-TW" altLang="zh-TW" dirty="0"/>
-              <a:t>，回傳給</a:t>
-            </a:r>
-            <a:r>
-              <a:rPr lang="en-US" altLang="zh-TW" dirty="0"/>
-              <a:t>SRC</a:t>
-            </a:r>
-            <a:r>
-              <a:rPr lang="zh-TW" altLang="zh-TW" dirty="0"/>
-              <a:t>監聽</a:t>
-            </a:r>
-            <a:r>
-              <a:rPr lang="en-US" altLang="zh-TW" dirty="0"/>
-              <a:t>Port</a:t>
-            </a:r>
-            <a:r>
-              <a:rPr lang="zh-TW" altLang="zh-TW" dirty="0" smtClean="0"/>
-              <a:t>，</a:t>
-            </a:r>
+              <a:t>   SOCKS4_REPLY</a:t>
+            </a:r>
+            <a:endParaRPr lang="zh-TW" altLang="zh-TW" dirty="0"/>
+          </a:p>
+          <a:p>
+            <a:pPr lvl="1"/>
             <a:r>
               <a:rPr lang="en-US" altLang="zh-TW" dirty="0" smtClean="0"/>
-              <a:t>	    DEST</a:t>
-            </a:r>
-            <a:r>
-              <a:rPr lang="zh-TW" altLang="zh-TW" dirty="0"/>
-              <a:t>就會自己連</a:t>
-            </a:r>
-            <a:r>
-              <a:rPr lang="zh-TW" altLang="zh-TW" dirty="0" smtClean="0"/>
-              <a:t>過來</a:t>
-            </a:r>
-            <a:endParaRPr lang="en-US" altLang="zh-TW" dirty="0" smtClean="0"/>
+              <a:t>CONNECT mode</a:t>
+            </a:r>
+            <a:endParaRPr lang="zh-TW" altLang="zh-TW" dirty="0"/>
           </a:p>
           <a:p>
             <a:pPr marL="0" indent="0">
@@ -14562,39 +14492,39 @@
             </a:r>
             <a:r>
               <a:rPr lang="en-US" altLang="zh-TW" dirty="0" smtClean="0"/>
-              <a:t>3. SOCKS </a:t>
+              <a:t>1.</a:t>
+            </a:r>
+            <a:r>
+              <a:rPr lang="zh-TW" altLang="zh-TW" dirty="0"/>
+              <a:t>從</a:t>
             </a:r>
             <a:r>
               <a:rPr lang="en-US" altLang="zh-TW" dirty="0"/>
-              <a:t>accept DEST</a:t>
+              <a:t>REQUEST</a:t>
             </a:r>
             <a:r>
               <a:rPr lang="zh-TW" altLang="zh-TW" dirty="0"/>
-              <a:t>之後，要再丟</a:t>
-            </a:r>
-            <a:r>
-              <a:rPr lang="zh-TW" altLang="zh-TW" dirty="0" smtClean="0"/>
-              <a:t>一個</a:t>
-            </a:r>
-            <a:r>
-              <a:rPr lang="en-US" altLang="zh-TW" dirty="0" smtClean="0"/>
-              <a:t>	  	    SOCKS4_REPLY</a:t>
+              <a:t>裡取出</a:t>
+            </a:r>
+            <a:r>
+              <a:rPr lang="en-US" altLang="zh-TW" dirty="0" err="1"/>
+              <a:t>dest</a:t>
             </a:r>
             <a:r>
               <a:rPr lang="zh-TW" altLang="zh-TW" dirty="0"/>
-              <a:t>給</a:t>
+              <a:t>的</a:t>
             </a:r>
             <a:r>
               <a:rPr lang="en-US" altLang="zh-TW" dirty="0"/>
-              <a:t>SRC	&lt;-- </a:t>
-            </a:r>
-            <a:r>
-              <a:rPr lang="zh-TW" altLang="zh-TW" b="1" u="sng" dirty="0"/>
-              <a:t>重要</a:t>
+              <a:t>IP</a:t>
+            </a:r>
+            <a:r>
+              <a:rPr lang="zh-TW" altLang="zh-TW" dirty="0"/>
+              <a:t>與</a:t>
             </a:r>
             <a:r>
               <a:rPr lang="en-US" altLang="zh-TW" dirty="0"/>
-              <a:t>!!!!!!!!!</a:t>
+              <a:t>PORT</a:t>
             </a:r>
             <a:endParaRPr lang="zh-TW" altLang="zh-TW" dirty="0"/>
           </a:p>
@@ -14608,28 +14538,17 @@
             </a:r>
             <a:r>
               <a:rPr lang="en-US" altLang="zh-TW" dirty="0" smtClean="0"/>
-              <a:t>4.SOCKS</a:t>
+              <a:t>2.SOCKS</a:t>
             </a:r>
             <a:r>
               <a:rPr lang="zh-TW" altLang="zh-TW" dirty="0"/>
-              <a:t>幫</a:t>
-            </a:r>
-            <a:r>
-              <a:rPr lang="en-US" altLang="zh-TW" dirty="0"/>
-              <a:t>SRC</a:t>
-            </a:r>
-            <a:r>
-              <a:rPr lang="zh-TW" altLang="zh-TW" dirty="0"/>
-              <a:t>與</a:t>
+              <a:t>連線到</a:t>
             </a:r>
             <a:r>
               <a:rPr lang="en-US" altLang="zh-TW" dirty="0"/>
               <a:t>DEST</a:t>
             </a:r>
-            <a:r>
-              <a:rPr lang="zh-TW" altLang="zh-TW" dirty="0"/>
-              <a:t>做資料傳導的動作</a:t>
-            </a:r>
+            <a:endParaRPr lang="zh-TW" altLang="zh-TW" dirty="0"/>
           </a:p>
           <a:p>
             <a:pPr marL="0" indent="0">
@@ -14637,15 +14556,15 @@
             </a:pPr>
             <a:r>
               <a:rPr lang="en-US" altLang="zh-TW" dirty="0"/>
-              <a:t> </a:t>
+              <a:t>	3</a:t>
             </a:r>
             <a:r>
               <a:rPr lang="en-US" altLang="zh-TW" dirty="0" smtClean="0"/>
-              <a:t>              </a:t>
-            </a:r>
-            <a:r>
-              <a:rPr lang="zh-TW" altLang="zh-TW" dirty="0" smtClean="0"/>
-              <a:t>－</a:t>
+              <a:t>.SOCKS</a:t>
+            </a:r>
+            <a:r>
+              <a:rPr lang="zh-TW" altLang="zh-TW" dirty="0"/>
+              <a:t>幫</a:t>
             </a:r>
             <a:r>
               <a:rPr lang="en-US" altLang="zh-TW" dirty="0"/>
@@ -14653,25 +14572,58 @@
             </a:r>
             <a:r>
               <a:rPr lang="zh-TW" altLang="zh-TW" dirty="0"/>
-              <a:t>傳來的資料－＞傳給</a:t>
+              <a:t>與</a:t>
             </a:r>
             <a:r>
               <a:rPr lang="en-US" altLang="zh-TW" dirty="0"/>
               <a:t>DEST</a:t>
             </a:r>
-            <a:endParaRPr lang="zh-TW" altLang="zh-TW" dirty="0"/>
+            <a:r>
+              <a:rPr lang="zh-TW" altLang="zh-TW" dirty="0"/>
+              <a:t>做資料傳導的</a:t>
+            </a:r>
+            <a:r>
+              <a:rPr lang="zh-TW" altLang="zh-TW" dirty="0" smtClean="0"/>
+              <a:t>動作</a:t>
+            </a:r>
           </a:p>
           <a:p>
             <a:pPr marL="0" indent="0">
               <a:buNone/>
             </a:pPr>
             <a:r>
+              <a:rPr lang="en-US" altLang="zh-TW" dirty="0" smtClean="0"/>
+              <a:t>	    </a:t>
+            </a:r>
+            <a:r>
+              <a:rPr lang="zh-TW" altLang="zh-TW" dirty="0" smtClean="0"/>
+              <a:t>－</a:t>
+            </a:r>
+            <a:r>
+              <a:rPr lang="en-US" altLang="zh-TW" dirty="0" smtClean="0"/>
+              <a:t>SRC</a:t>
+            </a:r>
+            <a:r>
+              <a:rPr lang="zh-TW" altLang="zh-TW" dirty="0" smtClean="0"/>
+              <a:t>傳來的資料－＞傳給</a:t>
+            </a:r>
+            <a:r>
+              <a:rPr lang="en-US" altLang="zh-TW" dirty="0" smtClean="0"/>
+              <a:t>DEST</a:t>
+            </a:r>
+            <a:endParaRPr lang="zh-TW" altLang="zh-TW" dirty="0" smtClean="0"/>
+          </a:p>
+          <a:p>
+            <a:pPr marL="0" indent="0">
+              <a:buNone/>
+            </a:pPr>
+            <a:r>
               <a:rPr lang="en-US" altLang="zh-TW" dirty="0"/>
-              <a:t> </a:t>
+              <a:t>	</a:t>
             </a:r>
             <a:r>
               <a:rPr lang="en-US" altLang="zh-TW" dirty="0" smtClean="0"/>
-              <a:t>              </a:t>
+              <a:t>    </a:t>
             </a:r>
             <a:r>
               <a:rPr lang="zh-TW" altLang="zh-TW" dirty="0" smtClean="0"/>
@@ -14699,7 +14651,7 @@
     </p:spTree>
     <p:extLst>
       <p:ext uri="{BB962C8B-B14F-4D97-AF65-F5344CB8AC3E}">
-        <p14:creationId xmlns:p14="http://schemas.microsoft.com/office/powerpoint/2010/main" val="649531083"/>
+        <p14:creationId xmlns:p14="http://schemas.microsoft.com/office/powerpoint/2010/main" val="3311866093"/>
       </p:ext>
     </p:extLst>
   </p:cSld>
@@ -14749,8 +14701,8 @@
           <a:lstStyle/>
           <a:p>
             <a:r>
-              <a:rPr lang="en-US" altLang="zh-TW" dirty="0" smtClean="0"/>
-              <a:t>Notes</a:t>
+              <a:rPr lang="en-US" altLang="zh-TW" dirty="0"/>
+              <a:t>Implementation Details</a:t>
             </a:r>
             <a:endParaRPr lang="zh-TW" altLang="en-US" dirty="0"/>
           </a:p>
@@ -14769,103 +14721,244 @@
         <p:spPr/>
         <p:txBody>
           <a:bodyPr>
-            <a:normAutofit fontScale="92500" lnSpcReduction="10000"/>
+            <a:normAutofit fontScale="85000" lnSpcReduction="10000"/>
           </a:bodyPr>
           <a:lstStyle/>
           <a:p>
             <a:r>
+              <a:rPr lang="en-US" altLang="zh-TW" dirty="0" smtClean="0"/>
+              <a:t>BIND mode</a:t>
+            </a:r>
+            <a:r>
+              <a:rPr lang="zh-TW" altLang="zh-TW" dirty="0" smtClean="0"/>
+              <a:t>：</a:t>
+            </a:r>
+            <a:endParaRPr lang="zh-TW" altLang="zh-TW" dirty="0"/>
+          </a:p>
+          <a:p>
+            <a:pPr marL="0" indent="0">
+              <a:buNone/>
+            </a:pPr>
+            <a:r>
               <a:rPr lang="en-US" altLang="zh-TW" dirty="0"/>
-              <a:t>SOCKS_REQUEST , </a:t>
+              <a:t>	</a:t>
             </a:r>
             <a:r>
               <a:rPr lang="en-US" altLang="zh-TW" dirty="0" smtClean="0"/>
-              <a:t>SOCKS_REPLY</a:t>
+              <a:t>1. SOCKS </a:t>
+            </a:r>
+            <a:r>
+              <a:rPr lang="zh-TW" altLang="zh-TW" dirty="0"/>
+              <a:t>先去</a:t>
+            </a:r>
+            <a:r>
+              <a:rPr lang="en-US" altLang="zh-TW" dirty="0"/>
+              <a:t>BIND</a:t>
+            </a:r>
+            <a:r>
+              <a:rPr lang="zh-TW" altLang="zh-TW" dirty="0"/>
+              <a:t>一個</a:t>
+            </a:r>
+            <a:r>
+              <a:rPr lang="en-US" altLang="zh-TW" dirty="0"/>
+              <a:t>port(BIND_PORT)</a:t>
             </a:r>
             <a:endParaRPr lang="zh-TW" altLang="zh-TW" dirty="0"/>
           </a:p>
           <a:p>
-            <a:pPr lvl="1"/>
+            <a:pPr marL="0" indent="0">
+              <a:buNone/>
+            </a:pPr>
             <a:r>
               <a:rPr lang="en-US" altLang="zh-TW" dirty="0"/>
-              <a:t>  1 byte : unsigned char</a:t>
+              <a:t>	</a:t>
+            </a:r>
+            <a:r>
+              <a:rPr lang="en-US" altLang="zh-TW" dirty="0" smtClean="0"/>
+              <a:t>2. SOCKS </a:t>
+            </a:r>
+            <a:r>
+              <a:rPr lang="en-US" altLang="zh-TW" dirty="0"/>
+              <a:t>listen</a:t>
+            </a:r>
+            <a:r>
+              <a:rPr lang="zh-TW" altLang="zh-TW" dirty="0"/>
+              <a:t>該</a:t>
+            </a:r>
+            <a:r>
+              <a:rPr lang="en-US" altLang="zh-TW" dirty="0"/>
+              <a:t>port</a:t>
+            </a:r>
+            <a:r>
+              <a:rPr lang="zh-TW" altLang="zh-TW" dirty="0"/>
+              <a:t>，回傳給</a:t>
+            </a:r>
+            <a:r>
+              <a:rPr lang="en-US" altLang="zh-TW" dirty="0"/>
+              <a:t>SRC</a:t>
+            </a:r>
+            <a:r>
+              <a:rPr lang="zh-TW" altLang="zh-TW" dirty="0"/>
+              <a:t>監聽</a:t>
+            </a:r>
+            <a:r>
+              <a:rPr lang="en-US" altLang="zh-TW" dirty="0"/>
+              <a:t>Port</a:t>
+            </a:r>
+            <a:r>
+              <a:rPr lang="zh-TW" altLang="zh-TW" dirty="0" smtClean="0"/>
+              <a:t>，</a:t>
+            </a:r>
+            <a:r>
+              <a:rPr lang="en-US" altLang="zh-TW" dirty="0" smtClean="0"/>
+              <a:t>	    DEST</a:t>
+            </a:r>
+            <a:r>
+              <a:rPr lang="zh-TW" altLang="zh-TW" dirty="0"/>
+              <a:t>就會自己連</a:t>
+            </a:r>
+            <a:r>
+              <a:rPr lang="zh-TW" altLang="zh-TW" dirty="0" smtClean="0"/>
+              <a:t>過來</a:t>
+            </a:r>
+            <a:endParaRPr lang="en-US" altLang="zh-TW" dirty="0" smtClean="0"/>
+          </a:p>
+          <a:p>
+            <a:pPr marL="0" indent="0">
+              <a:buNone/>
+            </a:pPr>
+            <a:r>
+              <a:rPr lang="en-US" altLang="zh-TW" dirty="0"/>
+              <a:t>	</a:t>
+            </a:r>
+            <a:r>
+              <a:rPr lang="en-US" altLang="zh-TW" dirty="0" smtClean="0"/>
+              <a:t>3. SOCKS </a:t>
+            </a:r>
+            <a:r>
+              <a:rPr lang="en-US" altLang="zh-TW" dirty="0"/>
+              <a:t>accept DEST</a:t>
+            </a:r>
+            <a:r>
+              <a:rPr lang="zh-TW" altLang="zh-TW" dirty="0"/>
+              <a:t>之後，要再丟</a:t>
+            </a:r>
+            <a:r>
+              <a:rPr lang="zh-TW" altLang="zh-TW" dirty="0" smtClean="0"/>
+              <a:t>一個</a:t>
+            </a:r>
+            <a:r>
+              <a:rPr lang="en-US" altLang="zh-TW" dirty="0" smtClean="0"/>
+              <a:t>	  	    SOCKS4_REPLY</a:t>
+            </a:r>
+            <a:r>
+              <a:rPr lang="zh-TW" altLang="zh-TW" dirty="0"/>
+              <a:t>給</a:t>
+            </a:r>
+            <a:r>
+              <a:rPr lang="en-US" altLang="zh-TW" dirty="0"/>
+              <a:t>SRC	&lt;-- </a:t>
+            </a:r>
+            <a:r>
+              <a:rPr lang="zh-TW" altLang="zh-TW" b="1" u="sng" dirty="0"/>
+              <a:t>重要</a:t>
+            </a:r>
+            <a:r>
+              <a:rPr lang="en-US" altLang="zh-TW" dirty="0"/>
+              <a:t>!!!!!!!!!</a:t>
             </a:r>
             <a:endParaRPr lang="zh-TW" altLang="zh-TW" dirty="0"/>
           </a:p>
           <a:p>
-            <a:pPr lvl="1"/>
+            <a:pPr marL="0" indent="0">
+              <a:buNone/>
+            </a:pPr>
             <a:r>
               <a:rPr lang="en-US" altLang="zh-TW" dirty="0"/>
-              <a:t>  2 byte : unsigned char[2]</a:t>
+              <a:t>	</a:t>
+            </a:r>
+            <a:r>
+              <a:rPr lang="en-US" altLang="zh-TW" dirty="0" smtClean="0"/>
+              <a:t>4.SOCKS</a:t>
+            </a:r>
+            <a:r>
+              <a:rPr lang="zh-TW" altLang="zh-TW" dirty="0"/>
+              <a:t>幫</a:t>
+            </a:r>
+            <a:r>
+              <a:rPr lang="en-US" altLang="zh-TW" dirty="0"/>
+              <a:t>SRC</a:t>
+            </a:r>
+            <a:r>
+              <a:rPr lang="zh-TW" altLang="zh-TW" dirty="0"/>
+              <a:t>與</a:t>
+            </a:r>
+            <a:r>
+              <a:rPr lang="en-US" altLang="zh-TW" dirty="0"/>
+              <a:t>DEST</a:t>
+            </a:r>
+            <a:r>
+              <a:rPr lang="zh-TW" altLang="zh-TW" dirty="0"/>
+              <a:t>做資料傳導的動作</a:t>
+            </a:r>
+          </a:p>
+          <a:p>
+            <a:pPr marL="0" indent="0">
+              <a:buNone/>
+            </a:pPr>
+            <a:r>
+              <a:rPr lang="en-US" altLang="zh-TW" dirty="0"/>
+              <a:t> </a:t>
+            </a:r>
+            <a:r>
+              <a:rPr lang="en-US" altLang="zh-TW" dirty="0" smtClean="0"/>
+              <a:t>              </a:t>
+            </a:r>
+            <a:r>
+              <a:rPr lang="zh-TW" altLang="zh-TW" dirty="0" smtClean="0"/>
+              <a:t>－</a:t>
+            </a:r>
+            <a:r>
+              <a:rPr lang="en-US" altLang="zh-TW" dirty="0"/>
+              <a:t>SRC</a:t>
+            </a:r>
+            <a:r>
+              <a:rPr lang="zh-TW" altLang="zh-TW" dirty="0"/>
+              <a:t>傳來的資料－＞傳給</a:t>
+            </a:r>
+            <a:r>
+              <a:rPr lang="en-US" altLang="zh-TW" dirty="0"/>
+              <a:t>DEST</a:t>
             </a:r>
             <a:endParaRPr lang="zh-TW" altLang="zh-TW" dirty="0"/>
           </a:p>
           <a:p>
-            <a:pPr lvl="1"/>
+            <a:pPr marL="0" indent="0">
+              <a:buNone/>
+            </a:pPr>
             <a:r>
               <a:rPr lang="en-US" altLang="zh-TW" dirty="0"/>
-              <a:t>  4 byte : unsigned char[4] </a:t>
-            </a:r>
-            <a:endParaRPr lang="zh-TW" altLang="zh-TW" dirty="0"/>
-          </a:p>
-          <a:p>
+              <a:t> </a:t>
+            </a:r>
             <a:r>
               <a:rPr lang="en-US" altLang="zh-TW" dirty="0" smtClean="0"/>
-              <a:t>Port formulation e.g. </a:t>
+              <a:t>              </a:t>
+            </a:r>
+            <a:r>
+              <a:rPr lang="zh-TW" altLang="zh-TW" dirty="0" smtClean="0"/>
+              <a:t>－</a:t>
             </a:r>
             <a:r>
               <a:rPr lang="en-US" altLang="zh-TW" dirty="0"/>
-              <a:t>port = 1234</a:t>
+              <a:t>DEST</a:t>
             </a:r>
             <a:r>
               <a:rPr lang="zh-TW" altLang="zh-TW" dirty="0"/>
-              <a:t>　</a:t>
-            </a:r>
-          </a:p>
-          <a:p>
-            <a:pPr lvl="1"/>
-            <a:r>
-              <a:rPr lang="zh-TW" altLang="zh-TW" dirty="0"/>
-              <a:t>　</a:t>
+              <a:t>傳來的資料－＞傳給</a:t>
             </a:r>
             <a:r>
               <a:rPr lang="en-US" altLang="zh-TW" dirty="0"/>
-              <a:t>unsigned char port[2]</a:t>
-            </a:r>
-            <a:endParaRPr lang="zh-TW" altLang="zh-TW" dirty="0"/>
-          </a:p>
-          <a:p>
-            <a:pPr lvl="1"/>
-            <a:r>
-              <a:rPr lang="zh-TW" altLang="zh-TW" dirty="0"/>
-              <a:t>　</a:t>
-            </a:r>
-            <a:r>
-              <a:rPr lang="en-US" altLang="zh-TW" dirty="0"/>
-              <a:t>port[0] = 4</a:t>
-            </a:r>
-            <a:endParaRPr lang="zh-TW" altLang="zh-TW" dirty="0"/>
-          </a:p>
-          <a:p>
-            <a:pPr lvl="1"/>
-            <a:r>
-              <a:rPr lang="en-US" altLang="zh-TW" dirty="0"/>
-              <a:t>  port[1] = 210</a:t>
-            </a:r>
-            <a:endParaRPr lang="zh-TW" altLang="zh-TW" dirty="0"/>
-          </a:p>
-          <a:p>
-            <a:pPr lvl="1"/>
-            <a:r>
-              <a:rPr lang="en-US" altLang="zh-TW" dirty="0"/>
-              <a:t>  (hint : (</a:t>
-            </a:r>
-            <a:r>
-              <a:rPr lang="en-US" altLang="zh-TW" dirty="0" err="1"/>
-              <a:t>int</a:t>
-            </a:r>
-            <a:r>
-              <a:rPr lang="en-US" altLang="zh-TW" dirty="0"/>
-              <a:t>)port = port[0]*256 + port[1]  ==&gt; 1234 = 4*256 + 210)</a:t>
+              <a:t>SRC</a:t>
             </a:r>
             <a:endParaRPr lang="zh-TW" altLang="zh-TW" dirty="0"/>
           </a:p>
@@ -14877,7 +14970,7 @@
     </p:spTree>
     <p:extLst>
       <p:ext uri="{BB962C8B-B14F-4D97-AF65-F5344CB8AC3E}">
-        <p14:creationId xmlns:p14="http://schemas.microsoft.com/office/powerpoint/2010/main" val="3646116525"/>
+        <p14:creationId xmlns:p14="http://schemas.microsoft.com/office/powerpoint/2010/main" val="649531083"/>
       </p:ext>
     </p:extLst>
   </p:cSld>
@@ -14947,77 +15040,107 @@
         <p:spPr/>
         <p:txBody>
           <a:bodyPr>
-            <a:normAutofit/>
+            <a:normAutofit fontScale="92500" lnSpcReduction="10000"/>
           </a:bodyPr>
           <a:lstStyle/>
           <a:p>
             <a:r>
+              <a:rPr lang="en-US" altLang="zh-TW" dirty="0"/>
+              <a:t>SOCKS_REQUEST , </a:t>
+            </a:r>
+            <a:r>
               <a:rPr lang="en-US" altLang="zh-TW" dirty="0" smtClean="0"/>
-              <a:t>IP formulations</a:t>
-            </a:r>
+              <a:t>SOCKS_REPLY</a:t>
+            </a:r>
+            <a:endParaRPr lang="zh-TW" altLang="zh-TW" dirty="0"/>
+          </a:p>
+          <a:p>
+            <a:pPr lvl="1"/>
             <a:r>
               <a:rPr lang="en-US" altLang="zh-TW" dirty="0"/>
-              <a:t> </a:t>
-            </a:r>
+              <a:t>  1 byte : unsigned char</a:t>
+            </a:r>
+            <a:endParaRPr lang="zh-TW" altLang="zh-TW" dirty="0"/>
+          </a:p>
+          <a:p>
+            <a:pPr lvl="1"/>
+            <a:r>
+              <a:rPr lang="en-US" altLang="zh-TW" dirty="0"/>
+              <a:t>  2 byte : unsigned char[2]</a:t>
+            </a:r>
+            <a:endParaRPr lang="zh-TW" altLang="zh-TW" dirty="0"/>
+          </a:p>
+          <a:p>
+            <a:pPr lvl="1"/>
+            <a:r>
+              <a:rPr lang="en-US" altLang="zh-TW" dirty="0"/>
+              <a:t>  4 byte : unsigned char[4] </a:t>
+            </a:r>
+            <a:endParaRPr lang="zh-TW" altLang="zh-TW" dirty="0"/>
+          </a:p>
+          <a:p>
             <a:r>
               <a:rPr lang="en-US" altLang="zh-TW" dirty="0" smtClean="0"/>
-              <a:t>e.g. </a:t>
+              <a:t>Port formulation e.g. </a:t>
             </a:r>
             <a:r>
               <a:rPr lang="en-US" altLang="zh-TW" dirty="0"/>
-              <a:t>IP = </a:t>
-            </a:r>
-            <a:r>
-              <a:rPr lang="en-US" altLang="zh-TW" dirty="0" smtClean="0"/>
-              <a:t>140.113.1.2</a:t>
+              <a:t>port = 1234</a:t>
+            </a:r>
+            <a:r>
+              <a:rPr lang="zh-TW" altLang="zh-TW" dirty="0"/>
+              <a:t>　</a:t>
+            </a:r>
+          </a:p>
+          <a:p>
+            <a:pPr lvl="1"/>
+            <a:r>
+              <a:rPr lang="zh-TW" altLang="zh-TW" dirty="0"/>
+              <a:t>　</a:t>
+            </a:r>
+            <a:r>
+              <a:rPr lang="en-US" altLang="zh-TW" dirty="0"/>
+              <a:t>unsigned char port[2]</a:t>
             </a:r>
             <a:endParaRPr lang="zh-TW" altLang="zh-TW" dirty="0"/>
           </a:p>
           <a:p>
             <a:pPr lvl="1"/>
             <a:r>
+              <a:rPr lang="zh-TW" altLang="zh-TW" dirty="0"/>
+              <a:t>　</a:t>
+            </a:r>
+            <a:r>
               <a:rPr lang="en-US" altLang="zh-TW" dirty="0"/>
-              <a:t>  unsigned char IP[4]</a:t>
+              <a:t>port[0] = 4</a:t>
             </a:r>
             <a:endParaRPr lang="zh-TW" altLang="zh-TW" dirty="0"/>
           </a:p>
           <a:p>
-            <a:pPr lvl="2"/>
+            <a:pPr lvl="1"/>
             <a:r>
               <a:rPr lang="en-US" altLang="zh-TW" dirty="0"/>
-              <a:t>  IP[0] = 140</a:t>
+              <a:t>  port[1] = 210</a:t>
             </a:r>
             <a:endParaRPr lang="zh-TW" altLang="zh-TW" dirty="0"/>
           </a:p>
           <a:p>
-            <a:pPr lvl="2"/>
+            <a:pPr lvl="1"/>
             <a:r>
               <a:rPr lang="en-US" altLang="zh-TW" dirty="0"/>
-              <a:t>  IP[1] = 113</a:t>
+              <a:t>  (hint : (</a:t>
+            </a:r>
+            <a:r>
+              <a:rPr lang="en-US" altLang="zh-TW" dirty="0" err="1"/>
+              <a:t>int</a:t>
+            </a:r>
+            <a:r>
+              <a:rPr lang="en-US" altLang="zh-TW" dirty="0"/>
+              <a:t>)port = port[0]*256 + port[1]  ==&gt; 1234 = 4*256 + 210)</a:t>
             </a:r>
             <a:endParaRPr lang="zh-TW" altLang="zh-TW" dirty="0"/>
           </a:p>
           <a:p>
-            <a:pPr lvl="2"/>
-            <a:r>
-              <a:rPr lang="en-US" altLang="zh-TW" dirty="0"/>
-              <a:t>  IP[2] = 1</a:t>
-            </a:r>
-            <a:endParaRPr lang="zh-TW" altLang="zh-TW" dirty="0"/>
-          </a:p>
-          <a:p>
-            <a:pPr lvl="2"/>
-            <a:r>
-              <a:rPr lang="en-US" altLang="zh-TW" dirty="0"/>
-              <a:t>  IP[3] = 2</a:t>
-            </a:r>
-            <a:endParaRPr lang="zh-TW" altLang="zh-TW" dirty="0"/>
-          </a:p>
-          <a:p>
-            <a:r>
-              <a:rPr lang="en-US" altLang="zh-TW" dirty="0" smtClean="0"/>
-              <a:t>In BIND mode, you need to ensure the connection between client and server is built before transfer data.</a:t>
-            </a:r>
             <a:endParaRPr lang="zh-TW" altLang="en-US" dirty="0"/>
           </a:p>
         </p:txBody>
@@ -15025,7 +15148,7 @@
     </p:spTree>
     <p:extLst>
       <p:ext uri="{BB962C8B-B14F-4D97-AF65-F5344CB8AC3E}">
-        <p14:creationId xmlns:p14="http://schemas.microsoft.com/office/powerpoint/2010/main" val="2099281382"/>
+        <p14:creationId xmlns:p14="http://schemas.microsoft.com/office/powerpoint/2010/main" val="3646116525"/>
       </p:ext>
     </p:extLst>
   </p:cSld>
@@ -15075,8 +15198,8 @@
           <a:lstStyle/>
           <a:p>
             <a:r>
-              <a:rPr lang="en-US" altLang="zh-TW" dirty="0"/>
-              <a:t>Schedule</a:t>
+              <a:rPr lang="en-US" altLang="zh-TW" dirty="0" smtClean="0"/>
+              <a:t>Requirements</a:t>
             </a:r>
             <a:endParaRPr lang="zh-TW" altLang="en-US" dirty="0"/>
           </a:p>
@@ -15094,33 +15217,134 @@
         </p:nvSpPr>
         <p:spPr/>
         <p:txBody>
-          <a:bodyPr/>
+          <a:bodyPr>
+            <a:normAutofit fontScale="92500" lnSpcReduction="10000"/>
+          </a:bodyPr>
           <a:lstStyle/>
           <a:p>
             <a:r>
               <a:rPr lang="en-US" altLang="zh-TW" dirty="0" smtClean="0"/>
-              <a:t>Deadline: </a:t>
+              <a:t>Code</a:t>
             </a:r>
           </a:p>
           <a:p>
             <a:pPr lvl="1"/>
             <a:r>
               <a:rPr lang="en-US" altLang="zh-TW" dirty="0" smtClean="0"/>
-              <a:t>2017/12/31 23:59 (Sunday)</a:t>
-            </a:r>
-          </a:p>
-          <a:p>
+              <a:t>Part I: </a:t>
+            </a:r>
+            <a:r>
+              <a:rPr lang="en-US" altLang="zh-TW" dirty="0"/>
+              <a:t>Socks4 Server </a:t>
+            </a:r>
+            <a:r>
+              <a:rPr lang="en-US" altLang="zh-TW" dirty="0">
+                <a:solidFill>
+                  <a:srgbClr val="FF0000"/>
+                </a:solidFill>
+              </a:rPr>
+              <a:t>Connect</a:t>
+            </a:r>
+            <a:r>
+              <a:rPr lang="en-US" altLang="zh-TW" dirty="0"/>
+              <a:t> </a:t>
+            </a:r>
             <a:r>
               <a:rPr lang="en-US" altLang="zh-TW" dirty="0" smtClean="0"/>
-              <a:t>Demo: </a:t>
+              <a:t>Mode</a:t>
             </a:r>
           </a:p>
           <a:p>
             <a:pPr lvl="1"/>
             <a:r>
+              <a:rPr lang="en-US" altLang="zh-TW" dirty="0"/>
+              <a:t>Part II: Socks4 Server </a:t>
+            </a:r>
+            <a:r>
+              <a:rPr lang="en-US" altLang="zh-TW" dirty="0">
+                <a:solidFill>
+                  <a:srgbClr val="FF0000"/>
+                </a:solidFill>
+              </a:rPr>
+              <a:t>Bind</a:t>
+            </a:r>
+            <a:r>
+              <a:rPr lang="en-US" altLang="zh-TW" dirty="0"/>
+              <a:t> </a:t>
+            </a:r>
+            <a:r>
               <a:rPr lang="en-US" altLang="zh-TW" dirty="0" smtClean="0"/>
-              <a:t>2018/01/02 10:00~17:00 (Tuesday)</a:t>
-            </a:r>
+              <a:t>Mode</a:t>
+            </a:r>
+          </a:p>
+          <a:p>
+            <a:pPr lvl="1"/>
+            <a:r>
+              <a:rPr lang="en-US" altLang="zh-TW" dirty="0"/>
+              <a:t>Part III: CGI </a:t>
+            </a:r>
+            <a:r>
+              <a:rPr lang="en-US" altLang="zh-TW" dirty="0" smtClean="0"/>
+              <a:t>Proxy</a:t>
+            </a:r>
+          </a:p>
+          <a:p>
+            <a:r>
+              <a:rPr lang="en-US" altLang="zh-TW" dirty="0" smtClean="0"/>
+              <a:t>Others</a:t>
+            </a:r>
+          </a:p>
+          <a:p>
+            <a:pPr lvl="1"/>
+            <a:r>
+              <a:rPr lang="en-US" altLang="zh-TW" dirty="0" smtClean="0"/>
+              <a:t>Name your </a:t>
+            </a:r>
+            <a:r>
+              <a:rPr lang="en-US" altLang="zh-TW" dirty="0" err="1" smtClean="0"/>
+              <a:t>cgi</a:t>
+            </a:r>
+            <a:r>
+              <a:rPr lang="en-US" altLang="zh-TW" dirty="0" smtClean="0"/>
+              <a:t> as hw4.cgi</a:t>
+            </a:r>
+          </a:p>
+          <a:p>
+            <a:pPr lvl="1"/>
+            <a:r>
+              <a:rPr lang="en-US" altLang="zh-TW" dirty="0" smtClean="0"/>
+              <a:t>Wrap your code into .zip (Do not upload test cases and </a:t>
+            </a:r>
+            <a:r>
+              <a:rPr lang="en-US" altLang="zh-TW" dirty="0" err="1" smtClean="0"/>
+              <a:t>git</a:t>
+            </a:r>
+            <a:r>
+              <a:rPr lang="en-US" altLang="zh-TW" dirty="0" smtClean="0"/>
+              <a:t> files)</a:t>
+            </a:r>
+          </a:p>
+          <a:p>
+            <a:pPr lvl="1"/>
+            <a:r>
+              <a:rPr lang="en-US" altLang="zh-TW" dirty="0" smtClean="0"/>
+              <a:t>Use </a:t>
+            </a:r>
+            <a:r>
+              <a:rPr lang="en-US" altLang="zh-TW" dirty="0"/>
+              <a:t>the concurrent, connection-oriented </a:t>
+            </a:r>
+            <a:r>
+              <a:rPr lang="en-US" altLang="zh-TW" dirty="0" smtClean="0"/>
+              <a:t>paradigm</a:t>
+            </a:r>
+            <a:r>
+              <a:rPr lang="en-US" altLang="zh-TW" dirty="0"/>
+              <a:t>.</a:t>
+            </a:r>
+            <a:endParaRPr lang="zh-TW" altLang="zh-TW" dirty="0"/>
+          </a:p>
+          <a:p>
             <a:endParaRPr lang="zh-TW" altLang="en-US" dirty="0"/>
           </a:p>
         </p:txBody>
@@ -15128,7 +15352,7 @@
     </p:spTree>
     <p:extLst>
       <p:ext uri="{BB962C8B-B14F-4D97-AF65-F5344CB8AC3E}">
-        <p14:creationId xmlns:p14="http://schemas.microsoft.com/office/powerpoint/2010/main" val="3987666752"/>
+        <p14:creationId xmlns:p14="http://schemas.microsoft.com/office/powerpoint/2010/main" val="3756322286"/>
       </p:ext>
     </p:extLst>
   </p:cSld>
@@ -15146,6 +15370,154 @@
 </file>
 
 <file path=ppt/slides/slide40.xml><?xml version="1.0" encoding="utf-8"?>
+<p:sld xmlns:a="http://schemas.openxmlformats.org/drawingml/2006/main" xmlns:r="http://schemas.openxmlformats.org/officeDocument/2006/relationships" xmlns:p="http://schemas.openxmlformats.org/presentationml/2006/main">
+  <p:cSld>
+    <p:spTree>
+      <p:nvGrpSpPr>
+        <p:cNvPr id="1" name=""/>
+        <p:cNvGrpSpPr/>
+        <p:nvPr/>
+      </p:nvGrpSpPr>
+      <p:grpSpPr>
+        <a:xfrm>
+          <a:off x="0" y="0"/>
+          <a:ext cx="0" cy="0"/>
+          <a:chOff x="0" y="0"/>
+          <a:chExt cx="0" cy="0"/>
+        </a:xfrm>
+      </p:grpSpPr>
+      <p:sp>
+        <p:nvSpPr>
+          <p:cNvPr id="2" name="標題 1"/>
+          <p:cNvSpPr>
+            <a:spLocks noGrp="1"/>
+          </p:cNvSpPr>
+          <p:nvPr>
+            <p:ph type="title"/>
+          </p:nvPr>
+        </p:nvSpPr>
+        <p:spPr/>
+        <p:txBody>
+          <a:bodyPr/>
+          <a:lstStyle/>
+          <a:p>
+            <a:r>
+              <a:rPr lang="en-US" altLang="zh-TW" dirty="0" smtClean="0"/>
+              <a:t>Notes</a:t>
+            </a:r>
+            <a:endParaRPr lang="zh-TW" altLang="en-US" dirty="0"/>
+          </a:p>
+        </p:txBody>
+      </p:sp>
+      <p:sp>
+        <p:nvSpPr>
+          <p:cNvPr id="3" name="內容版面配置區 2"/>
+          <p:cNvSpPr>
+            <a:spLocks noGrp="1"/>
+          </p:cNvSpPr>
+          <p:nvPr>
+            <p:ph idx="1"/>
+          </p:nvPr>
+        </p:nvSpPr>
+        <p:spPr/>
+        <p:txBody>
+          <a:bodyPr>
+            <a:normAutofit/>
+          </a:bodyPr>
+          <a:lstStyle/>
+          <a:p>
+            <a:r>
+              <a:rPr lang="en-US" altLang="zh-TW" dirty="0" smtClean="0"/>
+              <a:t>IP formulations</a:t>
+            </a:r>
+            <a:r>
+              <a:rPr lang="en-US" altLang="zh-TW" dirty="0"/>
+              <a:t> </a:t>
+            </a:r>
+            <a:r>
+              <a:rPr lang="en-US" altLang="zh-TW" dirty="0" smtClean="0"/>
+              <a:t>e.g. </a:t>
+            </a:r>
+            <a:r>
+              <a:rPr lang="en-US" altLang="zh-TW" dirty="0"/>
+              <a:t>IP = </a:t>
+            </a:r>
+            <a:r>
+              <a:rPr lang="en-US" altLang="zh-TW" dirty="0" smtClean="0"/>
+              <a:t>140.113.1.2</a:t>
+            </a:r>
+            <a:endParaRPr lang="zh-TW" altLang="zh-TW" dirty="0"/>
+          </a:p>
+          <a:p>
+            <a:pPr lvl="1"/>
+            <a:r>
+              <a:rPr lang="en-US" altLang="zh-TW" dirty="0"/>
+              <a:t>  unsigned char IP[4]</a:t>
+            </a:r>
+            <a:endParaRPr lang="zh-TW" altLang="zh-TW" dirty="0"/>
+          </a:p>
+          <a:p>
+            <a:pPr lvl="2"/>
+            <a:r>
+              <a:rPr lang="en-US" altLang="zh-TW" dirty="0"/>
+              <a:t>  IP[0] = 140</a:t>
+            </a:r>
+            <a:endParaRPr lang="zh-TW" altLang="zh-TW" dirty="0"/>
+          </a:p>
+          <a:p>
+            <a:pPr lvl="2"/>
+            <a:r>
+              <a:rPr lang="en-US" altLang="zh-TW" dirty="0"/>
+              <a:t>  IP[1] = 113</a:t>
+            </a:r>
+            <a:endParaRPr lang="zh-TW" altLang="zh-TW" dirty="0"/>
+          </a:p>
+          <a:p>
+            <a:pPr lvl="2"/>
+            <a:r>
+              <a:rPr lang="en-US" altLang="zh-TW" dirty="0"/>
+              <a:t>  IP[2] = 1</a:t>
+            </a:r>
+            <a:endParaRPr lang="zh-TW" altLang="zh-TW" dirty="0"/>
+          </a:p>
+          <a:p>
+            <a:pPr lvl="2"/>
+            <a:r>
+              <a:rPr lang="en-US" altLang="zh-TW" dirty="0"/>
+              <a:t>  IP[3] = 2</a:t>
+            </a:r>
+            <a:endParaRPr lang="zh-TW" altLang="zh-TW" dirty="0"/>
+          </a:p>
+          <a:p>
+            <a:r>
+              <a:rPr lang="en-US" altLang="zh-TW" dirty="0" smtClean="0"/>
+              <a:t>In BIND mode, you need to ensure the connection between client and server is built before transfer data.</a:t>
+            </a:r>
+            <a:endParaRPr lang="zh-TW" altLang="en-US" dirty="0"/>
+          </a:p>
+        </p:txBody>
+      </p:sp>
+    </p:spTree>
+    <p:extLst>
+      <p:ext uri="{BB962C8B-B14F-4D97-AF65-F5344CB8AC3E}">
+        <p14:creationId xmlns:p14="http://schemas.microsoft.com/office/powerpoint/2010/main" val="2099281382"/>
+      </p:ext>
+    </p:extLst>
+  </p:cSld>
+  <p:clrMapOvr>
+    <a:masterClrMapping/>
+  </p:clrMapOvr>
+  <p:timing>
+    <p:tnLst>
+      <p:par>
+        <p:cTn id="1" dur="indefinite" restart="never" nodeType="tmRoot"/>
+      </p:par>
+    </p:tnLst>
+  </p:timing>
+</p:sld>
+</file>
+
+<file path=ppt/slides/slide41.xml><?xml version="1.0" encoding="utf-8"?>
 <p:sld xmlns:a="http://schemas.openxmlformats.org/drawingml/2006/main" xmlns:r="http://schemas.openxmlformats.org/officeDocument/2006/relationships" xmlns:p="http://schemas.openxmlformats.org/presentationml/2006/main">
   <p:cSld>
     <p:spTree>
@@ -15236,7 +15608,7 @@
 </p:sld>
 </file>
 
-<file path=ppt/slides/slide41.xml><?xml version="1.0" encoding="utf-8"?>
+<file path=ppt/slides/slide42.xml><?xml version="1.0" encoding="utf-8"?>
 <p:sld xmlns:a="http://schemas.openxmlformats.org/drawingml/2006/main" xmlns:r="http://schemas.openxmlformats.org/officeDocument/2006/relationships" xmlns:p="http://schemas.openxmlformats.org/presentationml/2006/main">
   <p:cSld>
     <p:spTree>
@@ -15351,6 +15723,109 @@
             <a:spLocks noGrp="1"/>
           </p:cNvSpPr>
           <p:nvPr>
+            <p:ph type="title"/>
+          </p:nvPr>
+        </p:nvSpPr>
+        <p:spPr/>
+        <p:txBody>
+          <a:bodyPr/>
+          <a:lstStyle/>
+          <a:p>
+            <a:r>
+              <a:rPr lang="en-US" altLang="zh-TW" dirty="0"/>
+              <a:t>Schedule</a:t>
+            </a:r>
+            <a:endParaRPr lang="zh-TW" altLang="en-US" dirty="0"/>
+          </a:p>
+        </p:txBody>
+      </p:sp>
+      <p:sp>
+        <p:nvSpPr>
+          <p:cNvPr id="3" name="內容版面配置區 2"/>
+          <p:cNvSpPr>
+            <a:spLocks noGrp="1"/>
+          </p:cNvSpPr>
+          <p:nvPr>
+            <p:ph idx="1"/>
+          </p:nvPr>
+        </p:nvSpPr>
+        <p:spPr/>
+        <p:txBody>
+          <a:bodyPr/>
+          <a:lstStyle/>
+          <a:p>
+            <a:r>
+              <a:rPr lang="en-US" altLang="zh-TW" dirty="0" smtClean="0"/>
+              <a:t>Deadline: </a:t>
+            </a:r>
+          </a:p>
+          <a:p>
+            <a:pPr lvl="1"/>
+            <a:r>
+              <a:rPr lang="en-US" altLang="zh-TW" dirty="0" smtClean="0"/>
+              <a:t>2017/12/31 23:59 (Sunday)</a:t>
+            </a:r>
+          </a:p>
+          <a:p>
+            <a:r>
+              <a:rPr lang="en-US" altLang="zh-TW" dirty="0" smtClean="0"/>
+              <a:t>Demo: </a:t>
+            </a:r>
+          </a:p>
+          <a:p>
+            <a:pPr lvl="1"/>
+            <a:r>
+              <a:rPr lang="en-US" altLang="zh-TW" dirty="0" smtClean="0"/>
+              <a:t>2018/01/02 10:00~17:00 (Tuesday)</a:t>
+            </a:r>
+            <a:endParaRPr lang="zh-TW" altLang="en-US" dirty="0"/>
+          </a:p>
+        </p:txBody>
+      </p:sp>
+    </p:spTree>
+    <p:extLst>
+      <p:ext uri="{BB962C8B-B14F-4D97-AF65-F5344CB8AC3E}">
+        <p14:creationId xmlns:p14="http://schemas.microsoft.com/office/powerpoint/2010/main" val="3987666752"/>
+      </p:ext>
+    </p:extLst>
+  </p:cSld>
+  <p:clrMapOvr>
+    <a:masterClrMapping/>
+  </p:clrMapOvr>
+  <p:timing>
+    <p:tnLst>
+      <p:par>
+        <p:cTn id="1" dur="indefinite" restart="never" nodeType="tmRoot"/>
+      </p:par>
+    </p:tnLst>
+  </p:timing>
+</p:sld>
+</file>
+
+<file path=ppt/slides/slide6.xml><?xml version="1.0" encoding="utf-8"?>
+<p:sld xmlns:a="http://schemas.openxmlformats.org/drawingml/2006/main" xmlns:r="http://schemas.openxmlformats.org/officeDocument/2006/relationships" xmlns:p="http://schemas.openxmlformats.org/presentationml/2006/main">
+  <p:cSld>
+    <p:spTree>
+      <p:nvGrpSpPr>
+        <p:cNvPr id="1" name=""/>
+        <p:cNvGrpSpPr/>
+        <p:nvPr/>
+      </p:nvGrpSpPr>
+      <p:grpSpPr>
+        <a:xfrm>
+          <a:off x="0" y="0"/>
+          <a:ext cx="0" cy="0"/>
+          <a:chOff x="0" y="0"/>
+          <a:chExt cx="0" cy="0"/>
+        </a:xfrm>
+      </p:grpSpPr>
+      <p:sp>
+        <p:nvSpPr>
+          <p:cNvPr id="2" name="標題 1"/>
+          <p:cNvSpPr>
+            <a:spLocks noGrp="1"/>
+          </p:cNvSpPr>
+          <p:nvPr>
             <p:ph type="ctrTitle"/>
           </p:nvPr>
         </p:nvSpPr>
@@ -15425,7 +15900,7 @@
 </p:sld>
 </file>
 
-<file path=ppt/slides/slide6.xml><?xml version="1.0" encoding="utf-8"?>
+<file path=ppt/slides/slide7.xml><?xml version="1.0" encoding="utf-8"?>
 <p:sld xmlns:a="http://schemas.openxmlformats.org/drawingml/2006/main" xmlns:r="http://schemas.openxmlformats.org/officeDocument/2006/relationships" xmlns:p="http://schemas.openxmlformats.org/presentationml/2006/main">
   <p:cSld>
     <p:spTree>
@@ -16139,7 +16614,7 @@
 </p:sld>
 </file>
 
-<file path=ppt/slides/slide7.xml><?xml version="1.0" encoding="utf-8"?>
+<file path=ppt/slides/slide8.xml><?xml version="1.0" encoding="utf-8"?>
 <p:sld xmlns:a="http://schemas.openxmlformats.org/drawingml/2006/main" xmlns:r="http://schemas.openxmlformats.org/officeDocument/2006/relationships" xmlns:p="http://schemas.openxmlformats.org/presentationml/2006/main">
   <p:cSld>
     <p:spTree>
@@ -16378,7 +16853,7 @@
 </p:sld>
 </file>
 
-<file path=ppt/slides/slide8.xml><?xml version="1.0" encoding="utf-8"?>
+<file path=ppt/slides/slide9.xml><?xml version="1.0" encoding="utf-8"?>
 <p:sld xmlns:a="http://schemas.openxmlformats.org/drawingml/2006/main" xmlns:r="http://schemas.openxmlformats.org/officeDocument/2006/relationships" xmlns:p="http://schemas.openxmlformats.org/presentationml/2006/main">
   <p:cSld>
     <p:spTree>
@@ -16474,111 +16949,6 @@
     <p:extLst>
       <p:ext uri="{BB962C8B-B14F-4D97-AF65-F5344CB8AC3E}">
         <p14:creationId xmlns:p14="http://schemas.microsoft.com/office/powerpoint/2010/main" val="830572305"/>
-      </p:ext>
-    </p:extLst>
-  </p:cSld>
-  <p:clrMapOvr>
-    <a:masterClrMapping/>
-  </p:clrMapOvr>
-  <p:timing>
-    <p:tnLst>
-      <p:par>
-        <p:cTn id="1" dur="indefinite" restart="never" nodeType="tmRoot"/>
-      </p:par>
-    </p:tnLst>
-  </p:timing>
-</p:sld>
-</file>
-
-<file path=ppt/slides/slide9.xml><?xml version="1.0" encoding="utf-8"?>
-<p:sld xmlns:a="http://schemas.openxmlformats.org/drawingml/2006/main" xmlns:r="http://schemas.openxmlformats.org/officeDocument/2006/relationships" xmlns:p="http://schemas.openxmlformats.org/presentationml/2006/main">
-  <p:cSld>
-    <p:spTree>
-      <p:nvGrpSpPr>
-        <p:cNvPr id="1" name=""/>
-        <p:cNvGrpSpPr/>
-        <p:nvPr/>
-      </p:nvGrpSpPr>
-      <p:grpSpPr>
-        <a:xfrm>
-          <a:off x="0" y="0"/>
-          <a:ext cx="0" cy="0"/>
-          <a:chOff x="0" y="0"/>
-          <a:chExt cx="0" cy="0"/>
-        </a:xfrm>
-      </p:grpSpPr>
-      <p:sp>
-        <p:nvSpPr>
-          <p:cNvPr id="2" name="標題 1"/>
-          <p:cNvSpPr>
-            <a:spLocks noGrp="1"/>
-          </p:cNvSpPr>
-          <p:nvPr>
-            <p:ph type="title"/>
-          </p:nvPr>
-        </p:nvSpPr>
-        <p:spPr/>
-        <p:txBody>
-          <a:bodyPr>
-            <a:normAutofit/>
-          </a:bodyPr>
-          <a:lstStyle/>
-          <a:p>
-            <a:r>
-              <a:rPr lang="en-US" altLang="zh-TW" dirty="0" smtClean="0"/>
-              <a:t>Browser Setting</a:t>
-            </a:r>
-            <a:endParaRPr lang="zh-TW" altLang="en-US" dirty="0"/>
-          </a:p>
-        </p:txBody>
-      </p:sp>
-      <p:sp>
-        <p:nvSpPr>
-          <p:cNvPr id="3" name="內容版面配置區 2"/>
-          <p:cNvSpPr>
-            <a:spLocks noGrp="1"/>
-          </p:cNvSpPr>
-          <p:nvPr>
-            <p:ph idx="1"/>
-          </p:nvPr>
-        </p:nvSpPr>
-        <p:spPr/>
-        <p:txBody>
-          <a:bodyPr/>
-          <a:lstStyle/>
-          <a:p>
-            <a:endParaRPr lang="zh-TW" altLang="en-US" dirty="0"/>
-          </a:p>
-        </p:txBody>
-      </p:sp>
-      <p:pic>
-        <p:nvPicPr>
-          <p:cNvPr id="4" name="圖片 3"/>
-          <p:cNvPicPr>
-            <a:picLocks noChangeAspect="1"/>
-          </p:cNvPicPr>
-          <p:nvPr/>
-        </p:nvPicPr>
-        <p:blipFill>
-          <a:blip r:embed="rId2"/>
-          <a:stretch>
-            <a:fillRect/>
-          </a:stretch>
-        </p:blipFill>
-        <p:spPr>
-          <a:xfrm>
-            <a:off x="395536" y="1197150"/>
-            <a:ext cx="7344816" cy="5408711"/>
-          </a:xfrm>
-          <a:prstGeom prst="rect">
-            <a:avLst/>
-          </a:prstGeom>
-        </p:spPr>
-      </p:pic>
-    </p:spTree>
-    <p:extLst>
-      <p:ext uri="{BB962C8B-B14F-4D97-AF65-F5344CB8AC3E}">
-        <p14:creationId xmlns:p14="http://schemas.microsoft.com/office/powerpoint/2010/main" val="3096852479"/>
       </p:ext>
     </p:extLst>
   </p:cSld>

</xml_diff>